<commit_message>
modified FOOD SERVICE APPLICATION ppt
</commit_message>
<xml_diff>
--- a/Food Service Application.pptx
+++ b/Food Service Application.pptx
@@ -6,6 +6,21 @@
   </p:sldMasterIdLst>
   <p:sldIdLst>
     <p:sldId id="256" r:id="rId2"/>
+    <p:sldId id="257" r:id="rId3"/>
+    <p:sldId id="258" r:id="rId4"/>
+    <p:sldId id="260" r:id="rId5"/>
+    <p:sldId id="262" r:id="rId6"/>
+    <p:sldId id="263" r:id="rId7"/>
+    <p:sldId id="264" r:id="rId8"/>
+    <p:sldId id="265" r:id="rId9"/>
+    <p:sldId id="266" r:id="rId10"/>
+    <p:sldId id="267" r:id="rId11"/>
+    <p:sldId id="268" r:id="rId12"/>
+    <p:sldId id="269" r:id="rId13"/>
+    <p:sldId id="270" r:id="rId14"/>
+    <p:sldId id="271" r:id="rId15"/>
+    <p:sldId id="272" r:id="rId16"/>
+    <p:sldId id="273" r:id="rId17"/>
   </p:sldIdLst>
   <p:sldSz cx="12192000" cy="6858000"/>
   <p:notesSz cx="6858000" cy="9144000"/>
@@ -104,6 +119,11 @@
       </a:defRPr>
     </a:lvl9pPr>
   </p:defaultTextStyle>
+  <p:extLst>
+    <p:ext uri="{EFAFB233-063F-42B5-8137-9DF3F51BA10A}">
+      <p15:sldGuideLst xmlns:p15="http://schemas.microsoft.com/office/powerpoint/2012/main"/>
+    </p:ext>
+  </p:extLst>
 </p:presentation>
 </file>
 
@@ -157,7 +177,7 @@
           <a:noFill/>
           <a:extLst>
             <a:ext uri="{909E8E84-426E-40dd-AFC4-6F175D3DCCD1}">
-              <a14:hiddenFill xmlns:a14="http://schemas.microsoft.com/office/drawing/2010/main" xmlns="">
+              <a14:hiddenFill xmlns="" xmlns:a14="http://schemas.microsoft.com/office/drawing/2010/main">
                 <a:solidFill>
                   <a:srgbClr val="FFFFFF"/>
                 </a:solidFill>
@@ -217,7 +237,7 @@
             </a:ln>
             <a:extLst>
               <a:ext uri="{91240B29-F687-4f45-9708-019B960494DF}">
-                <a14:hiddenLine xmlns:a14="http://schemas.microsoft.com/office/drawing/2010/main" xmlns="" w="9525">
+                <a14:hiddenLine xmlns="" xmlns:a14="http://schemas.microsoft.com/office/drawing/2010/main" w="9525">
                   <a:solidFill>
                     <a:srgbClr val="000000"/>
                   </a:solidFill>
@@ -307,7 +327,7 @@
             </a:ln>
             <a:extLst>
               <a:ext uri="{91240B29-F687-4f45-9708-019B960494DF}">
-                <a14:hiddenLine xmlns:a14="http://schemas.microsoft.com/office/drawing/2010/main" xmlns="" w="9525">
+                <a14:hiddenLine xmlns="" xmlns:a14="http://schemas.microsoft.com/office/drawing/2010/main" w="9525">
                   <a:solidFill>
                     <a:srgbClr val="000000"/>
                   </a:solidFill>
@@ -397,7 +417,7 @@
             </a:ln>
             <a:extLst>
               <a:ext uri="{91240B29-F687-4f45-9708-019B960494DF}">
-                <a14:hiddenLine xmlns:a14="http://schemas.microsoft.com/office/drawing/2010/main" xmlns="" w="9525">
+                <a14:hiddenLine xmlns="" xmlns:a14="http://schemas.microsoft.com/office/drawing/2010/main" w="9525">
                   <a:solidFill>
                     <a:srgbClr val="000000"/>
                   </a:solidFill>
@@ -431,7 +451,7 @@
             </a:ln>
             <a:extLst>
               <a:ext uri="{91240B29-F687-4f45-9708-019B960494DF}">
-                <a14:hiddenLine xmlns:a14="http://schemas.microsoft.com/office/drawing/2010/main" xmlns="" w="9525">
+                <a14:hiddenLine xmlns="" xmlns:a14="http://schemas.microsoft.com/office/drawing/2010/main" w="9525">
                   <a:solidFill>
                     <a:srgbClr val="000000"/>
                   </a:solidFill>
@@ -521,7 +541,7 @@
             </a:ln>
             <a:extLst>
               <a:ext uri="{91240B29-F687-4f45-9708-019B960494DF}">
-                <a14:hiddenLine xmlns:a14="http://schemas.microsoft.com/office/drawing/2010/main" xmlns="" w="9525">
+                <a14:hiddenLine xmlns="" xmlns:a14="http://schemas.microsoft.com/office/drawing/2010/main" w="9525">
                   <a:solidFill>
                     <a:srgbClr val="000000"/>
                   </a:solidFill>
@@ -583,7 +603,7 @@
             </a:ln>
             <a:extLst>
               <a:ext uri="{91240B29-F687-4f45-9708-019B960494DF}">
-                <a14:hiddenLine xmlns:a14="http://schemas.microsoft.com/office/drawing/2010/main" xmlns="" w="9525">
+                <a14:hiddenLine xmlns="" xmlns:a14="http://schemas.microsoft.com/office/drawing/2010/main" w="9525">
                   <a:solidFill>
                     <a:srgbClr val="000000"/>
                   </a:solidFill>
@@ -645,7 +665,7 @@
             </a:ln>
             <a:extLst>
               <a:ext uri="{91240B29-F687-4f45-9708-019B960494DF}">
-                <a14:hiddenLine xmlns:a14="http://schemas.microsoft.com/office/drawing/2010/main" xmlns="" w="9525">
+                <a14:hiddenLine xmlns="" xmlns:a14="http://schemas.microsoft.com/office/drawing/2010/main" w="9525">
                   <a:solidFill>
                     <a:srgbClr val="000000"/>
                   </a:solidFill>
@@ -735,7 +755,7 @@
             </a:ln>
             <a:extLst>
               <a:ext uri="{91240B29-F687-4f45-9708-019B960494DF}">
-                <a14:hiddenLine xmlns:a14="http://schemas.microsoft.com/office/drawing/2010/main" xmlns="" w="9525">
+                <a14:hiddenLine xmlns="" xmlns:a14="http://schemas.microsoft.com/office/drawing/2010/main" w="9525">
                   <a:solidFill>
                     <a:srgbClr val="000000"/>
                   </a:solidFill>
@@ -797,7 +817,7 @@
             </a:ln>
             <a:extLst>
               <a:ext uri="{91240B29-F687-4f45-9708-019B960494DF}">
-                <a14:hiddenLine xmlns:a14="http://schemas.microsoft.com/office/drawing/2010/main" xmlns="" w="9525">
+                <a14:hiddenLine xmlns="" xmlns:a14="http://schemas.microsoft.com/office/drawing/2010/main" w="9525">
                   <a:solidFill>
                     <a:srgbClr val="000000"/>
                   </a:solidFill>
@@ -859,7 +879,7 @@
             </a:ln>
             <a:extLst>
               <a:ext uri="{91240B29-F687-4f45-9708-019B960494DF}">
-                <a14:hiddenLine xmlns:a14="http://schemas.microsoft.com/office/drawing/2010/main" xmlns="" w="9525">
+                <a14:hiddenLine xmlns="" xmlns:a14="http://schemas.microsoft.com/office/drawing/2010/main" w="9525">
                   <a:solidFill>
                     <a:srgbClr val="000000"/>
                   </a:solidFill>
@@ -949,7 +969,7 @@
             </a:ln>
             <a:extLst>
               <a:ext uri="{91240B29-F687-4f45-9708-019B960494DF}">
-                <a14:hiddenLine xmlns:a14="http://schemas.microsoft.com/office/drawing/2010/main" xmlns="" w="9525">
+                <a14:hiddenLine xmlns="" xmlns:a14="http://schemas.microsoft.com/office/drawing/2010/main" w="9525">
                   <a:solidFill>
                     <a:srgbClr val="000000"/>
                   </a:solidFill>
@@ -1039,7 +1059,7 @@
             </a:ln>
             <a:extLst>
               <a:ext uri="{91240B29-F687-4f45-9708-019B960494DF}">
-                <a14:hiddenLine xmlns:a14="http://schemas.microsoft.com/office/drawing/2010/main" xmlns="" w="9525">
+                <a14:hiddenLine xmlns="" xmlns:a14="http://schemas.microsoft.com/office/drawing/2010/main" w="9525">
                   <a:solidFill>
                     <a:srgbClr val="000000"/>
                   </a:solidFill>
@@ -1101,7 +1121,7 @@
             </a:ln>
             <a:extLst>
               <a:ext uri="{91240B29-F687-4f45-9708-019B960494DF}">
-                <a14:hiddenLine xmlns:a14="http://schemas.microsoft.com/office/drawing/2010/main" xmlns="" w="9525">
+                <a14:hiddenLine xmlns="" xmlns:a14="http://schemas.microsoft.com/office/drawing/2010/main" w="9525">
                   <a:solidFill>
                     <a:srgbClr val="000000"/>
                   </a:solidFill>
@@ -1211,7 +1231,7 @@
             </a:ln>
             <a:extLst>
               <a:ext uri="{91240B29-F687-4f45-9708-019B960494DF}">
-                <a14:hiddenLine xmlns:a14="http://schemas.microsoft.com/office/drawing/2010/main" xmlns="" w="9525">
+                <a14:hiddenLine xmlns="" xmlns:a14="http://schemas.microsoft.com/office/drawing/2010/main" w="9525">
                   <a:solidFill>
                     <a:srgbClr val="000000"/>
                   </a:solidFill>
@@ -1273,7 +1293,7 @@
             </a:ln>
             <a:extLst>
               <a:ext uri="{91240B29-F687-4f45-9708-019B960494DF}">
-                <a14:hiddenLine xmlns:a14="http://schemas.microsoft.com/office/drawing/2010/main" xmlns="" w="9525">
+                <a14:hiddenLine xmlns="" xmlns:a14="http://schemas.microsoft.com/office/drawing/2010/main" w="9525">
                   <a:solidFill>
                     <a:srgbClr val="000000"/>
                   </a:solidFill>
@@ -1363,7 +1383,7 @@
             </a:ln>
             <a:extLst>
               <a:ext uri="{91240B29-F687-4f45-9708-019B960494DF}">
-                <a14:hiddenLine xmlns:a14="http://schemas.microsoft.com/office/drawing/2010/main" xmlns="" w="9525">
+                <a14:hiddenLine xmlns="" xmlns:a14="http://schemas.microsoft.com/office/drawing/2010/main" w="9525">
                   <a:solidFill>
                     <a:srgbClr val="000000"/>
                   </a:solidFill>
@@ -1453,7 +1473,7 @@
             </a:ln>
             <a:extLst>
               <a:ext uri="{91240B29-F687-4f45-9708-019B960494DF}">
-                <a14:hiddenLine xmlns:a14="http://schemas.microsoft.com/office/drawing/2010/main" xmlns="" w="9525">
+                <a14:hiddenLine xmlns="" xmlns:a14="http://schemas.microsoft.com/office/drawing/2010/main" w="9525">
                   <a:solidFill>
                     <a:srgbClr val="000000"/>
                   </a:solidFill>
@@ -1515,7 +1535,7 @@
             </a:ln>
             <a:extLst>
               <a:ext uri="{91240B29-F687-4f45-9708-019B960494DF}">
-                <a14:hiddenLine xmlns:a14="http://schemas.microsoft.com/office/drawing/2010/main" xmlns="" w="9525">
+                <a14:hiddenLine xmlns="" xmlns:a14="http://schemas.microsoft.com/office/drawing/2010/main" w="9525">
                   <a:solidFill>
                     <a:srgbClr val="000000"/>
                   </a:solidFill>
@@ -1605,7 +1625,7 @@
             </a:ln>
             <a:extLst>
               <a:ext uri="{91240B29-F687-4f45-9708-019B960494DF}">
-                <a14:hiddenLine xmlns:a14="http://schemas.microsoft.com/office/drawing/2010/main" xmlns="" w="9525">
+                <a14:hiddenLine xmlns="" xmlns:a14="http://schemas.microsoft.com/office/drawing/2010/main" w="9525">
                   <a:solidFill>
                     <a:srgbClr val="000000"/>
                   </a:solidFill>
@@ -1695,7 +1715,7 @@
             </a:ln>
             <a:extLst>
               <a:ext uri="{91240B29-F687-4f45-9708-019B960494DF}">
-                <a14:hiddenLine xmlns:a14="http://schemas.microsoft.com/office/drawing/2010/main" xmlns="" w="9525">
+                <a14:hiddenLine xmlns="" xmlns:a14="http://schemas.microsoft.com/office/drawing/2010/main" w="9525">
                   <a:solidFill>
                     <a:srgbClr val="000000"/>
                   </a:solidFill>
@@ -1751,7 +1771,7 @@
             </a:ln>
             <a:extLst>
               <a:ext uri="{91240B29-F687-4f45-9708-019B960494DF}">
-                <a14:hiddenLine xmlns:a14="http://schemas.microsoft.com/office/drawing/2010/main" xmlns="" w="9525">
+                <a14:hiddenLine xmlns="" xmlns:a14="http://schemas.microsoft.com/office/drawing/2010/main" w="9525">
                   <a:solidFill>
                     <a:srgbClr val="000000"/>
                   </a:solidFill>
@@ -1841,7 +1861,7 @@
             </a:ln>
             <a:extLst>
               <a:ext uri="{91240B29-F687-4f45-9708-019B960494DF}">
-                <a14:hiddenLine xmlns:a14="http://schemas.microsoft.com/office/drawing/2010/main" xmlns="" w="9525">
+                <a14:hiddenLine xmlns="" xmlns:a14="http://schemas.microsoft.com/office/drawing/2010/main" w="9525">
                   <a:solidFill>
                     <a:srgbClr val="000000"/>
                   </a:solidFill>
@@ -1897,7 +1917,7 @@
             </a:ln>
             <a:extLst>
               <a:ext uri="{91240B29-F687-4f45-9708-019B960494DF}">
-                <a14:hiddenLine xmlns:a14="http://schemas.microsoft.com/office/drawing/2010/main" xmlns="" w="9525">
+                <a14:hiddenLine xmlns="" xmlns:a14="http://schemas.microsoft.com/office/drawing/2010/main" w="9525">
                   <a:solidFill>
                     <a:srgbClr val="000000"/>
                   </a:solidFill>
@@ -1987,7 +2007,7 @@
             </a:ln>
             <a:extLst>
               <a:ext uri="{91240B29-F687-4f45-9708-019B960494DF}">
-                <a14:hiddenLine xmlns:a14="http://schemas.microsoft.com/office/drawing/2010/main" xmlns="" w="9525">
+                <a14:hiddenLine xmlns="" xmlns:a14="http://schemas.microsoft.com/office/drawing/2010/main" w="9525">
                   <a:solidFill>
                     <a:srgbClr val="000000"/>
                   </a:solidFill>
@@ -2055,7 +2075,7 @@
             </a:ln>
             <a:extLst>
               <a:ext uri="{91240B29-F687-4f45-9708-019B960494DF}">
-                <a14:hiddenLine xmlns:a14="http://schemas.microsoft.com/office/drawing/2010/main" xmlns="" w="9525">
+                <a14:hiddenLine xmlns="" xmlns:a14="http://schemas.microsoft.com/office/drawing/2010/main" w="9525">
                   <a:solidFill>
                     <a:srgbClr val="000000"/>
                   </a:solidFill>
@@ -2145,7 +2165,7 @@
             </a:ln>
             <a:extLst>
               <a:ext uri="{91240B29-F687-4f45-9708-019B960494DF}">
-                <a14:hiddenLine xmlns:a14="http://schemas.microsoft.com/office/drawing/2010/main" xmlns="" w="9525">
+                <a14:hiddenLine xmlns="" xmlns:a14="http://schemas.microsoft.com/office/drawing/2010/main" w="9525">
                   <a:solidFill>
                     <a:srgbClr val="000000"/>
                   </a:solidFill>
@@ -2213,7 +2233,7 @@
             </a:ln>
             <a:extLst>
               <a:ext uri="{91240B29-F687-4f45-9708-019B960494DF}">
-                <a14:hiddenLine xmlns:a14="http://schemas.microsoft.com/office/drawing/2010/main" xmlns="" w="9525">
+                <a14:hiddenLine xmlns="" xmlns:a14="http://schemas.microsoft.com/office/drawing/2010/main" w="9525">
                   <a:solidFill>
                     <a:srgbClr val="000000"/>
                   </a:solidFill>
@@ -2303,7 +2323,7 @@
             </a:ln>
             <a:extLst>
               <a:ext uri="{91240B29-F687-4f45-9708-019B960494DF}">
-                <a14:hiddenLine xmlns:a14="http://schemas.microsoft.com/office/drawing/2010/main" xmlns="" w="9525">
+                <a14:hiddenLine xmlns="" xmlns:a14="http://schemas.microsoft.com/office/drawing/2010/main" w="9525">
                   <a:solidFill>
                     <a:srgbClr val="000000"/>
                   </a:solidFill>
@@ -2337,7 +2357,7 @@
             </a:ln>
             <a:extLst>
               <a:ext uri="{91240B29-F687-4f45-9708-019B960494DF}">
-                <a14:hiddenLine xmlns:a14="http://schemas.microsoft.com/office/drawing/2010/main" xmlns="" w="9525">
+                <a14:hiddenLine xmlns="" xmlns:a14="http://schemas.microsoft.com/office/drawing/2010/main" w="9525">
                   <a:solidFill>
                     <a:srgbClr val="000000"/>
                   </a:solidFill>
@@ -2427,7 +2447,7 @@
             </a:ln>
             <a:extLst>
               <a:ext uri="{91240B29-F687-4f45-9708-019B960494DF}">
-                <a14:hiddenLine xmlns:a14="http://schemas.microsoft.com/office/drawing/2010/main" xmlns="" w="9525">
+                <a14:hiddenLine xmlns="" xmlns:a14="http://schemas.microsoft.com/office/drawing/2010/main" w="9525">
                   <a:solidFill>
                     <a:srgbClr val="000000"/>
                   </a:solidFill>
@@ -2489,7 +2509,7 @@
             </a:ln>
             <a:extLst>
               <a:ext uri="{91240B29-F687-4f45-9708-019B960494DF}">
-                <a14:hiddenLine xmlns:a14="http://schemas.microsoft.com/office/drawing/2010/main" xmlns="" w="9525">
+                <a14:hiddenLine xmlns="" xmlns:a14="http://schemas.microsoft.com/office/drawing/2010/main" w="9525">
                   <a:solidFill>
                     <a:srgbClr val="000000"/>
                   </a:solidFill>
@@ -2551,7 +2571,7 @@
             </a:ln>
             <a:extLst>
               <a:ext uri="{91240B29-F687-4f45-9708-019B960494DF}">
-                <a14:hiddenLine xmlns:a14="http://schemas.microsoft.com/office/drawing/2010/main" xmlns="" w="9525">
+                <a14:hiddenLine xmlns="" xmlns:a14="http://schemas.microsoft.com/office/drawing/2010/main" w="9525">
                   <a:solidFill>
                     <a:srgbClr val="000000"/>
                   </a:solidFill>
@@ -2641,7 +2661,7 @@
             </a:ln>
             <a:extLst>
               <a:ext uri="{91240B29-F687-4f45-9708-019B960494DF}">
-                <a14:hiddenLine xmlns:a14="http://schemas.microsoft.com/office/drawing/2010/main" xmlns="" w="9525">
+                <a14:hiddenLine xmlns="" xmlns:a14="http://schemas.microsoft.com/office/drawing/2010/main" w="9525">
                   <a:solidFill>
                     <a:srgbClr val="000000"/>
                   </a:solidFill>
@@ -2709,7 +2729,7 @@
             </a:ln>
             <a:extLst>
               <a:ext uri="{91240B29-F687-4f45-9708-019B960494DF}">
-                <a14:hiddenLine xmlns:a14="http://schemas.microsoft.com/office/drawing/2010/main" xmlns="" w="9525">
+                <a14:hiddenLine xmlns="" xmlns:a14="http://schemas.microsoft.com/office/drawing/2010/main" w="9525">
                   <a:solidFill>
                     <a:srgbClr val="000000"/>
                   </a:solidFill>
@@ -2771,7 +2791,7 @@
             </a:ln>
             <a:extLst>
               <a:ext uri="{91240B29-F687-4f45-9708-019B960494DF}">
-                <a14:hiddenLine xmlns:a14="http://schemas.microsoft.com/office/drawing/2010/main" xmlns="" w="9525">
+                <a14:hiddenLine xmlns="" xmlns:a14="http://schemas.microsoft.com/office/drawing/2010/main" w="9525">
                   <a:solidFill>
                     <a:srgbClr val="000000"/>
                   </a:solidFill>
@@ -2861,7 +2881,7 @@
             </a:ln>
             <a:extLst>
               <a:ext uri="{91240B29-F687-4f45-9708-019B960494DF}">
-                <a14:hiddenLine xmlns:a14="http://schemas.microsoft.com/office/drawing/2010/main" xmlns="" w="9525">
+                <a14:hiddenLine xmlns="" xmlns:a14="http://schemas.microsoft.com/office/drawing/2010/main" w="9525">
                   <a:solidFill>
                     <a:srgbClr val="000000"/>
                   </a:solidFill>
@@ -2923,7 +2943,7 @@
             </a:ln>
             <a:extLst>
               <a:ext uri="{91240B29-F687-4f45-9708-019B960494DF}">
-                <a14:hiddenLine xmlns:a14="http://schemas.microsoft.com/office/drawing/2010/main" xmlns="" w="9525">
+                <a14:hiddenLine xmlns="" xmlns:a14="http://schemas.microsoft.com/office/drawing/2010/main" w="9525">
                   <a:solidFill>
                     <a:srgbClr val="000000"/>
                   </a:solidFill>
@@ -3013,7 +3033,7 @@
             </a:ln>
             <a:extLst>
               <a:ext uri="{91240B29-F687-4f45-9708-019B960494DF}">
-                <a14:hiddenLine xmlns:a14="http://schemas.microsoft.com/office/drawing/2010/main" xmlns="" w="9525">
+                <a14:hiddenLine xmlns="" xmlns:a14="http://schemas.microsoft.com/office/drawing/2010/main" w="9525">
                   <a:solidFill>
                     <a:srgbClr val="000000"/>
                   </a:solidFill>
@@ -3075,7 +3095,7 @@
             </a:ln>
             <a:extLst>
               <a:ext uri="{91240B29-F687-4f45-9708-019B960494DF}">
-                <a14:hiddenLine xmlns:a14="http://schemas.microsoft.com/office/drawing/2010/main" xmlns="" w="9525">
+                <a14:hiddenLine xmlns="" xmlns:a14="http://schemas.microsoft.com/office/drawing/2010/main" w="9525">
                   <a:solidFill>
                     <a:srgbClr val="000000"/>
                   </a:solidFill>
@@ -3165,7 +3185,7 @@
             </a:ln>
             <a:extLst>
               <a:ext uri="{91240B29-F687-4f45-9708-019B960494DF}">
-                <a14:hiddenLine xmlns:a14="http://schemas.microsoft.com/office/drawing/2010/main" xmlns="" w="9525">
+                <a14:hiddenLine xmlns="" xmlns:a14="http://schemas.microsoft.com/office/drawing/2010/main" w="9525">
                   <a:solidFill>
                     <a:srgbClr val="000000"/>
                   </a:solidFill>
@@ -3199,7 +3219,7 @@
             </a:ln>
             <a:extLst>
               <a:ext uri="{91240B29-F687-4f45-9708-019B960494DF}">
-                <a14:hiddenLine xmlns:a14="http://schemas.microsoft.com/office/drawing/2010/main" xmlns="" w="9525">
+                <a14:hiddenLine xmlns="" xmlns:a14="http://schemas.microsoft.com/office/drawing/2010/main" w="9525">
                   <a:solidFill>
                     <a:srgbClr val="000000"/>
                   </a:solidFill>
@@ -3264,7 +3284,7 @@
             </a:ln>
             <a:extLst>
               <a:ext uri="{91240B29-F687-4f45-9708-019B960494DF}">
-                <a14:hiddenLine xmlns:a14="http://schemas.microsoft.com/office/drawing/2010/main" xmlns="" w="9525">
+                <a14:hiddenLine xmlns="" xmlns:a14="http://schemas.microsoft.com/office/drawing/2010/main" w="9525">
                   <a:solidFill>
                     <a:srgbClr val="000000"/>
                   </a:solidFill>
@@ -3354,7 +3374,7 @@
             </a:ln>
             <a:extLst>
               <a:ext uri="{91240B29-F687-4f45-9708-019B960494DF}">
-                <a14:hiddenLine xmlns:a14="http://schemas.microsoft.com/office/drawing/2010/main" xmlns="" w="9525">
+                <a14:hiddenLine xmlns="" xmlns:a14="http://schemas.microsoft.com/office/drawing/2010/main" w="9525">
                   <a:solidFill>
                     <a:srgbClr val="000000"/>
                   </a:solidFill>
@@ -3416,7 +3436,7 @@
             </a:ln>
             <a:extLst>
               <a:ext uri="{91240B29-F687-4f45-9708-019B960494DF}">
-                <a14:hiddenLine xmlns:a14="http://schemas.microsoft.com/office/drawing/2010/main" xmlns="" w="9525">
+                <a14:hiddenLine xmlns="" xmlns:a14="http://schemas.microsoft.com/office/drawing/2010/main" w="9525">
                   <a:solidFill>
                     <a:srgbClr val="000000"/>
                   </a:solidFill>
@@ -3506,7 +3526,7 @@
             </a:ln>
             <a:extLst>
               <a:ext uri="{91240B29-F687-4f45-9708-019B960494DF}">
-                <a14:hiddenLine xmlns:a14="http://schemas.microsoft.com/office/drawing/2010/main" xmlns="" w="9525">
+                <a14:hiddenLine xmlns="" xmlns:a14="http://schemas.microsoft.com/office/drawing/2010/main" w="9525">
                   <a:solidFill>
                     <a:srgbClr val="000000"/>
                   </a:solidFill>
@@ -3596,7 +3616,7 @@
             </a:ln>
             <a:extLst>
               <a:ext uri="{91240B29-F687-4f45-9708-019B960494DF}">
-                <a14:hiddenLine xmlns:a14="http://schemas.microsoft.com/office/drawing/2010/main" xmlns="" w="9525">
+                <a14:hiddenLine xmlns="" xmlns:a14="http://schemas.microsoft.com/office/drawing/2010/main" w="9525">
                   <a:solidFill>
                     <a:srgbClr val="000000"/>
                   </a:solidFill>
@@ -3661,7 +3681,7 @@
             </a:ln>
             <a:extLst>
               <a:ext uri="{91240B29-F687-4f45-9708-019B960494DF}">
-                <a14:hiddenLine xmlns:a14="http://schemas.microsoft.com/office/drawing/2010/main" xmlns="" w="9525">
+                <a14:hiddenLine xmlns="" xmlns:a14="http://schemas.microsoft.com/office/drawing/2010/main" w="9525">
                   <a:solidFill>
                     <a:srgbClr val="000000"/>
                   </a:solidFill>
@@ -3723,7 +3743,7 @@
             </a:ln>
             <a:extLst>
               <a:ext uri="{91240B29-F687-4f45-9708-019B960494DF}">
-                <a14:hiddenLine xmlns:a14="http://schemas.microsoft.com/office/drawing/2010/main" xmlns="" w="9525">
+                <a14:hiddenLine xmlns="" xmlns:a14="http://schemas.microsoft.com/office/drawing/2010/main" w="9525">
                   <a:solidFill>
                     <a:srgbClr val="000000"/>
                   </a:solidFill>
@@ -3813,7 +3833,7 @@
             </a:ln>
             <a:extLst>
               <a:ext uri="{91240B29-F687-4f45-9708-019B960494DF}">
-                <a14:hiddenLine xmlns:a14="http://schemas.microsoft.com/office/drawing/2010/main" xmlns="" w="9525">
+                <a14:hiddenLine xmlns="" xmlns:a14="http://schemas.microsoft.com/office/drawing/2010/main" w="9525">
                   <a:solidFill>
                     <a:srgbClr val="000000"/>
                   </a:solidFill>
@@ -3903,7 +3923,7 @@
             </a:ln>
             <a:extLst>
               <a:ext uri="{91240B29-F687-4f45-9708-019B960494DF}">
-                <a14:hiddenLine xmlns:a14="http://schemas.microsoft.com/office/drawing/2010/main" xmlns="" w="9525">
+                <a14:hiddenLine xmlns="" xmlns:a14="http://schemas.microsoft.com/office/drawing/2010/main" w="9525">
                   <a:solidFill>
                     <a:srgbClr val="000000"/>
                   </a:solidFill>
@@ -3965,7 +3985,7 @@
             </a:ln>
             <a:extLst>
               <a:ext uri="{91240B29-F687-4f45-9708-019B960494DF}">
-                <a14:hiddenLine xmlns:a14="http://schemas.microsoft.com/office/drawing/2010/main" xmlns="" w="9525">
+                <a14:hiddenLine xmlns="" xmlns:a14="http://schemas.microsoft.com/office/drawing/2010/main" w="9525">
                   <a:solidFill>
                     <a:srgbClr val="000000"/>
                   </a:solidFill>
@@ -4085,7 +4105,7 @@
             </a:ln>
             <a:extLst>
               <a:ext uri="{91240B29-F687-4f45-9708-019B960494DF}">
-                <a14:hiddenLine xmlns:a14="http://schemas.microsoft.com/office/drawing/2010/main" xmlns="" w="9525">
+                <a14:hiddenLine xmlns="" xmlns:a14="http://schemas.microsoft.com/office/drawing/2010/main" w="9525">
                   <a:solidFill>
                     <a:srgbClr val="000000"/>
                   </a:solidFill>
@@ -4153,7 +4173,7 @@
             </a:ln>
             <a:extLst>
               <a:ext uri="{91240B29-F687-4f45-9708-019B960494DF}">
-                <a14:hiddenLine xmlns:a14="http://schemas.microsoft.com/office/drawing/2010/main" xmlns="" w="9525">
+                <a14:hiddenLine xmlns="" xmlns:a14="http://schemas.microsoft.com/office/drawing/2010/main" w="9525">
                   <a:solidFill>
                     <a:srgbClr val="000000"/>
                   </a:solidFill>
@@ -4243,7 +4263,7 @@
             </a:ln>
             <a:extLst>
               <a:ext uri="{91240B29-F687-4f45-9708-019B960494DF}">
-                <a14:hiddenLine xmlns:a14="http://schemas.microsoft.com/office/drawing/2010/main" xmlns="" w="9525">
+                <a14:hiddenLine xmlns="" xmlns:a14="http://schemas.microsoft.com/office/drawing/2010/main" w="9525">
                   <a:solidFill>
                     <a:srgbClr val="000000"/>
                   </a:solidFill>
@@ -4383,7 +4403,7 @@
           <a:p>
             <a:fld id="{48A87A34-81AB-432B-8DAE-1953F412C126}" type="datetimeFigureOut">
               <a:rPr lang="en-US" dirty="0"/>
-              <a:t>10/9/2023</a:t>
+              <a:t>10/10/2023</a:t>
             </a:fld>
             <a:endParaRPr lang="en-US" dirty="0"/>
           </a:p>
@@ -4645,7 +4665,7 @@
           <a:p>
             <a:fld id="{48A87A34-81AB-432B-8DAE-1953F412C126}" type="datetimeFigureOut">
               <a:rPr lang="en-US" dirty="0"/>
-              <a:t>10/9/2023</a:t>
+              <a:t>10/10/2023</a:t>
             </a:fld>
             <a:endParaRPr lang="en-US" dirty="0"/>
           </a:p>
@@ -4836,7 +4856,7 @@
           <a:p>
             <a:fld id="{48A87A34-81AB-432B-8DAE-1953F412C126}" type="datetimeFigureOut">
               <a:rPr lang="en-US" dirty="0"/>
-              <a:t>10/9/2023</a:t>
+              <a:t>10/10/2023</a:t>
             </a:fld>
             <a:endParaRPr lang="en-US" dirty="0"/>
           </a:p>
@@ -5094,7 +5114,7 @@
           <a:p>
             <a:fld id="{48A87A34-81AB-432B-8DAE-1953F412C126}" type="datetimeFigureOut">
               <a:rPr lang="en-US" dirty="0"/>
-              <a:t>10/9/2023</a:t>
+              <a:t>10/10/2023</a:t>
             </a:fld>
             <a:endParaRPr lang="en-US" dirty="0"/>
           </a:p>
@@ -5523,7 +5543,7 @@
           <a:p>
             <a:fld id="{48A87A34-81AB-432B-8DAE-1953F412C126}" type="datetimeFigureOut">
               <a:rPr lang="en-US" dirty="0"/>
-              <a:t>10/9/2023</a:t>
+              <a:t>10/10/2023</a:t>
             </a:fld>
             <a:endParaRPr lang="en-US" dirty="0"/>
           </a:p>
@@ -6064,7 +6084,7 @@
           <a:p>
             <a:fld id="{48A87A34-81AB-432B-8DAE-1953F412C126}" type="datetimeFigureOut">
               <a:rPr lang="en-US" dirty="0"/>
-              <a:t>10/9/2023</a:t>
+              <a:t>10/10/2023</a:t>
             </a:fld>
             <a:endParaRPr lang="en-US" dirty="0"/>
           </a:p>
@@ -6779,7 +6799,7 @@
           <a:p>
             <a:fld id="{48A87A34-81AB-432B-8DAE-1953F412C126}" type="datetimeFigureOut">
               <a:rPr lang="en-US" dirty="0"/>
-              <a:t>10/9/2023</a:t>
+              <a:t>10/10/2023</a:t>
             </a:fld>
             <a:endParaRPr lang="en-US" dirty="0"/>
           </a:p>
@@ -6944,7 +6964,7 @@
           <a:p>
             <a:fld id="{48A87A34-81AB-432B-8DAE-1953F412C126}" type="datetimeFigureOut">
               <a:rPr lang="en-US" dirty="0"/>
-              <a:t>10/9/2023</a:t>
+              <a:t>10/10/2023</a:t>
             </a:fld>
             <a:endParaRPr lang="en-US" dirty="0"/>
           </a:p>
@@ -7119,7 +7139,7 @@
           <a:p>
             <a:fld id="{48A87A34-81AB-432B-8DAE-1953F412C126}" type="datetimeFigureOut">
               <a:rPr lang="en-US" dirty="0"/>
-              <a:t>10/9/2023</a:t>
+              <a:t>10/10/2023</a:t>
             </a:fld>
             <a:endParaRPr lang="en-US" dirty="0"/>
           </a:p>
@@ -7284,7 +7304,7 @@
           <a:p>
             <a:fld id="{48A87A34-81AB-432B-8DAE-1953F412C126}" type="datetimeFigureOut">
               <a:rPr lang="en-US" dirty="0"/>
-              <a:t>10/9/2023</a:t>
+              <a:t>10/10/2023</a:t>
             </a:fld>
             <a:endParaRPr lang="en-US" dirty="0"/>
           </a:p>
@@ -7529,7 +7549,7 @@
           <a:p>
             <a:fld id="{48A87A34-81AB-432B-8DAE-1953F412C126}" type="datetimeFigureOut">
               <a:rPr lang="en-US" dirty="0"/>
-              <a:t>10/9/2023</a:t>
+              <a:t>10/10/2023</a:t>
             </a:fld>
             <a:endParaRPr lang="en-US" dirty="0"/>
           </a:p>
@@ -7756,7 +7776,7 @@
           <a:p>
             <a:fld id="{48A87A34-81AB-432B-8DAE-1953F412C126}" type="datetimeFigureOut">
               <a:rPr lang="en-US" dirty="0"/>
-              <a:t>10/9/2023</a:t>
+              <a:t>10/10/2023</a:t>
             </a:fld>
             <a:endParaRPr lang="en-US" dirty="0"/>
           </a:p>
@@ -8132,7 +8152,7 @@
           <a:p>
             <a:fld id="{48A87A34-81AB-432B-8DAE-1953F412C126}" type="datetimeFigureOut">
               <a:rPr lang="en-US" dirty="0"/>
-              <a:t>10/9/2023</a:t>
+              <a:t>10/10/2023</a:t>
             </a:fld>
             <a:endParaRPr lang="en-US" dirty="0"/>
           </a:p>
@@ -8245,7 +8265,7 @@
           <a:p>
             <a:fld id="{48A87A34-81AB-432B-8DAE-1953F412C126}" type="datetimeFigureOut">
               <a:rPr lang="en-US" dirty="0"/>
-              <a:t>10/9/2023</a:t>
+              <a:t>10/10/2023</a:t>
             </a:fld>
             <a:endParaRPr lang="en-US" dirty="0"/>
           </a:p>
@@ -8335,7 +8355,7 @@
           <a:p>
             <a:fld id="{48A87A34-81AB-432B-8DAE-1953F412C126}" type="datetimeFigureOut">
               <a:rPr lang="en-US" dirty="0"/>
-              <a:t>10/9/2023</a:t>
+              <a:t>10/10/2023</a:t>
             </a:fld>
             <a:endParaRPr lang="en-US" dirty="0"/>
           </a:p>
@@ -8579,7 +8599,7 @@
           <a:p>
             <a:fld id="{48A87A34-81AB-432B-8DAE-1953F412C126}" type="datetimeFigureOut">
               <a:rPr lang="en-US" dirty="0"/>
-              <a:t>10/9/2023</a:t>
+              <a:t>10/10/2023</a:t>
             </a:fld>
             <a:endParaRPr lang="en-US" dirty="0"/>
           </a:p>
@@ -8854,7 +8874,7 @@
           <a:p>
             <a:fld id="{48A87A34-81AB-432B-8DAE-1953F412C126}" type="datetimeFigureOut">
               <a:rPr lang="en-US" dirty="0"/>
-              <a:t>10/9/2023</a:t>
+              <a:t>10/10/2023</a:t>
             </a:fld>
             <a:endParaRPr lang="en-US" dirty="0"/>
           </a:p>
@@ -8965,7 +8985,7 @@
           <a:noFill/>
           <a:extLst>
             <a:ext uri="{909E8E84-426E-40dd-AFC4-6F175D3DCCD1}">
-              <a14:hiddenFill xmlns:a14="http://schemas.microsoft.com/office/drawing/2010/main" xmlns="">
+              <a14:hiddenFill xmlns="" xmlns:a14="http://schemas.microsoft.com/office/drawing/2010/main">
                 <a:solidFill>
                   <a:srgbClr val="FFFFFF"/>
                 </a:solidFill>
@@ -9039,7 +9059,7 @@
               </a:ln>
               <a:extLst>
                 <a:ext uri="{91240B29-F687-4f45-9708-019B960494DF}">
-                  <a14:hiddenLine xmlns:a14="http://schemas.microsoft.com/office/drawing/2010/main" xmlns="" w="9525">
+                  <a14:hiddenLine xmlns="" xmlns:a14="http://schemas.microsoft.com/office/drawing/2010/main" w="9525">
                     <a:solidFill>
                       <a:srgbClr val="000000"/>
                     </a:solidFill>
@@ -9129,7 +9149,7 @@
               </a:ln>
               <a:extLst>
                 <a:ext uri="{91240B29-F687-4f45-9708-019B960494DF}">
-                  <a14:hiddenLine xmlns:a14="http://schemas.microsoft.com/office/drawing/2010/main" xmlns="" w="9525">
+                  <a14:hiddenLine xmlns="" xmlns:a14="http://schemas.microsoft.com/office/drawing/2010/main" w="9525">
                     <a:solidFill>
                       <a:srgbClr val="000000"/>
                     </a:solidFill>
@@ -9219,7 +9239,7 @@
               </a:ln>
               <a:extLst>
                 <a:ext uri="{91240B29-F687-4f45-9708-019B960494DF}">
-                  <a14:hiddenLine xmlns:a14="http://schemas.microsoft.com/office/drawing/2010/main" xmlns="" w="9525">
+                  <a14:hiddenLine xmlns="" xmlns:a14="http://schemas.microsoft.com/office/drawing/2010/main" w="9525">
                     <a:solidFill>
                       <a:srgbClr val="000000"/>
                     </a:solidFill>
@@ -9281,7 +9301,7 @@
               </a:ln>
               <a:extLst>
                 <a:ext uri="{91240B29-F687-4f45-9708-019B960494DF}">
-                  <a14:hiddenLine xmlns:a14="http://schemas.microsoft.com/office/drawing/2010/main" xmlns="" w="9525">
+                  <a14:hiddenLine xmlns="" xmlns:a14="http://schemas.microsoft.com/office/drawing/2010/main" w="9525">
                     <a:solidFill>
                       <a:srgbClr val="000000"/>
                     </a:solidFill>
@@ -9371,7 +9391,7 @@
               </a:ln>
               <a:extLst>
                 <a:ext uri="{91240B29-F687-4f45-9708-019B960494DF}">
-                  <a14:hiddenLine xmlns:a14="http://schemas.microsoft.com/office/drawing/2010/main" xmlns="" w="9525">
+                  <a14:hiddenLine xmlns="" xmlns:a14="http://schemas.microsoft.com/office/drawing/2010/main" w="9525">
                     <a:solidFill>
                       <a:srgbClr val="000000"/>
                     </a:solidFill>
@@ -9433,7 +9453,7 @@
               </a:ln>
               <a:extLst>
                 <a:ext uri="{91240B29-F687-4f45-9708-019B960494DF}">
-                  <a14:hiddenLine xmlns:a14="http://schemas.microsoft.com/office/drawing/2010/main" xmlns="" w="9525">
+                  <a14:hiddenLine xmlns="" xmlns:a14="http://schemas.microsoft.com/office/drawing/2010/main" w="9525">
                     <a:solidFill>
                       <a:srgbClr val="000000"/>
                     </a:solidFill>
@@ -9495,7 +9515,7 @@
               </a:ln>
               <a:extLst>
                 <a:ext uri="{91240B29-F687-4f45-9708-019B960494DF}">
-                  <a14:hiddenLine xmlns:a14="http://schemas.microsoft.com/office/drawing/2010/main" xmlns="" w="9525">
+                  <a14:hiddenLine xmlns="" xmlns:a14="http://schemas.microsoft.com/office/drawing/2010/main" w="9525">
                     <a:solidFill>
                       <a:srgbClr val="000000"/>
                     </a:solidFill>
@@ -9585,7 +9605,7 @@
               </a:ln>
               <a:extLst>
                 <a:ext uri="{91240B29-F687-4f45-9708-019B960494DF}">
-                  <a14:hiddenLine xmlns:a14="http://schemas.microsoft.com/office/drawing/2010/main" xmlns="" w="9525">
+                  <a14:hiddenLine xmlns="" xmlns:a14="http://schemas.microsoft.com/office/drawing/2010/main" w="9525">
                     <a:solidFill>
                       <a:srgbClr val="000000"/>
                     </a:solidFill>
@@ -9675,7 +9695,7 @@
               </a:ln>
               <a:extLst>
                 <a:ext uri="{91240B29-F687-4f45-9708-019B960494DF}">
-                  <a14:hiddenLine xmlns:a14="http://schemas.microsoft.com/office/drawing/2010/main" xmlns="" w="9525">
+                  <a14:hiddenLine xmlns="" xmlns:a14="http://schemas.microsoft.com/office/drawing/2010/main" w="9525">
                     <a:solidFill>
                       <a:srgbClr val="000000"/>
                     </a:solidFill>
@@ -9737,7 +9757,7 @@
               </a:ln>
               <a:extLst>
                 <a:ext uri="{91240B29-F687-4f45-9708-019B960494DF}">
-                  <a14:hiddenLine xmlns:a14="http://schemas.microsoft.com/office/drawing/2010/main" xmlns="" w="9525">
+                  <a14:hiddenLine xmlns="" xmlns:a14="http://schemas.microsoft.com/office/drawing/2010/main" w="9525">
                     <a:solidFill>
                       <a:srgbClr val="000000"/>
                     </a:solidFill>
@@ -9847,7 +9867,7 @@
               </a:ln>
               <a:extLst>
                 <a:ext uri="{91240B29-F687-4f45-9708-019B960494DF}">
-                  <a14:hiddenLine xmlns:a14="http://schemas.microsoft.com/office/drawing/2010/main" xmlns="" w="9525">
+                  <a14:hiddenLine xmlns="" xmlns:a14="http://schemas.microsoft.com/office/drawing/2010/main" w="9525">
                     <a:solidFill>
                       <a:srgbClr val="000000"/>
                     </a:solidFill>
@@ -9931,7 +9951,7 @@
               </a:ln>
               <a:extLst>
                 <a:ext uri="{91240B29-F687-4f45-9708-019B960494DF}">
-                  <a14:hiddenLine xmlns:a14="http://schemas.microsoft.com/office/drawing/2010/main" xmlns="" w="9525">
+                  <a14:hiddenLine xmlns="" xmlns:a14="http://schemas.microsoft.com/office/drawing/2010/main" w="9525">
                     <a:solidFill>
                       <a:srgbClr val="000000"/>
                     </a:solidFill>
@@ -9993,7 +10013,7 @@
               </a:ln>
               <a:extLst>
                 <a:ext uri="{91240B29-F687-4f45-9708-019B960494DF}">
-                  <a14:hiddenLine xmlns:a14="http://schemas.microsoft.com/office/drawing/2010/main" xmlns="" w="9525">
+                  <a14:hiddenLine xmlns="" xmlns:a14="http://schemas.microsoft.com/office/drawing/2010/main" w="9525">
                     <a:solidFill>
                       <a:srgbClr val="000000"/>
                     </a:solidFill>
@@ -10055,7 +10075,7 @@
               </a:ln>
               <a:extLst>
                 <a:ext uri="{91240B29-F687-4f45-9708-019B960494DF}">
-                  <a14:hiddenLine xmlns:a14="http://schemas.microsoft.com/office/drawing/2010/main" xmlns="" w="9525">
+                  <a14:hiddenLine xmlns="" xmlns:a14="http://schemas.microsoft.com/office/drawing/2010/main" w="9525">
                     <a:solidFill>
                       <a:srgbClr val="000000"/>
                     </a:solidFill>
@@ -10145,7 +10165,7 @@
               </a:ln>
               <a:extLst>
                 <a:ext uri="{91240B29-F687-4f45-9708-019B960494DF}">
-                  <a14:hiddenLine xmlns:a14="http://schemas.microsoft.com/office/drawing/2010/main" xmlns="" w="9525">
+                  <a14:hiddenLine xmlns="" xmlns:a14="http://schemas.microsoft.com/office/drawing/2010/main" w="9525">
                     <a:solidFill>
                       <a:srgbClr val="000000"/>
                     </a:solidFill>
@@ -10179,7 +10199,7 @@
               </a:ln>
               <a:extLst>
                 <a:ext uri="{91240B29-F687-4f45-9708-019B960494DF}">
-                  <a14:hiddenLine xmlns:a14="http://schemas.microsoft.com/office/drawing/2010/main" xmlns="" w="9525">
+                  <a14:hiddenLine xmlns="" xmlns:a14="http://schemas.microsoft.com/office/drawing/2010/main" w="9525">
                     <a:solidFill>
                       <a:srgbClr val="000000"/>
                     </a:solidFill>
@@ -10244,7 +10264,7 @@
               </a:ln>
               <a:extLst>
                 <a:ext uri="{91240B29-F687-4f45-9708-019B960494DF}">
-                  <a14:hiddenLine xmlns:a14="http://schemas.microsoft.com/office/drawing/2010/main" xmlns="" w="9525">
+                  <a14:hiddenLine xmlns="" xmlns:a14="http://schemas.microsoft.com/office/drawing/2010/main" w="9525">
                     <a:solidFill>
                       <a:srgbClr val="000000"/>
                     </a:solidFill>
@@ -10334,7 +10354,7 @@
               </a:ln>
               <a:extLst>
                 <a:ext uri="{91240B29-F687-4f45-9708-019B960494DF}">
-                  <a14:hiddenLine xmlns:a14="http://schemas.microsoft.com/office/drawing/2010/main" xmlns="" w="9525">
+                  <a14:hiddenLine xmlns="" xmlns:a14="http://schemas.microsoft.com/office/drawing/2010/main" w="9525">
                     <a:solidFill>
                       <a:srgbClr val="000000"/>
                     </a:solidFill>
@@ -10396,7 +10416,7 @@
               </a:ln>
               <a:extLst>
                 <a:ext uri="{91240B29-F687-4f45-9708-019B960494DF}">
-                  <a14:hiddenLine xmlns:a14="http://schemas.microsoft.com/office/drawing/2010/main" xmlns="" w="9525">
+                  <a14:hiddenLine xmlns="" xmlns:a14="http://schemas.microsoft.com/office/drawing/2010/main" w="9525">
                     <a:solidFill>
                       <a:srgbClr val="000000"/>
                     </a:solidFill>
@@ -10486,7 +10506,7 @@
               </a:ln>
               <a:extLst>
                 <a:ext uri="{91240B29-F687-4f45-9708-019B960494DF}">
-                  <a14:hiddenLine xmlns:a14="http://schemas.microsoft.com/office/drawing/2010/main" xmlns="" w="9525">
+                  <a14:hiddenLine xmlns="" xmlns:a14="http://schemas.microsoft.com/office/drawing/2010/main" w="9525">
                     <a:solidFill>
                       <a:srgbClr val="000000"/>
                     </a:solidFill>
@@ -10551,7 +10571,7 @@
               </a:ln>
               <a:extLst>
                 <a:ext uri="{91240B29-F687-4f45-9708-019B960494DF}">
-                  <a14:hiddenLine xmlns:a14="http://schemas.microsoft.com/office/drawing/2010/main" xmlns="" w="9525">
+                  <a14:hiddenLine xmlns="" xmlns:a14="http://schemas.microsoft.com/office/drawing/2010/main" w="9525">
                     <a:solidFill>
                       <a:srgbClr val="000000"/>
                     </a:solidFill>
@@ -10613,7 +10633,7 @@
               </a:ln>
               <a:extLst>
                 <a:ext uri="{91240B29-F687-4f45-9708-019B960494DF}">
-                  <a14:hiddenLine xmlns:a14="http://schemas.microsoft.com/office/drawing/2010/main" xmlns="" w="9525">
+                  <a14:hiddenLine xmlns="" xmlns:a14="http://schemas.microsoft.com/office/drawing/2010/main" w="9525">
                     <a:solidFill>
                       <a:srgbClr val="000000"/>
                     </a:solidFill>
@@ -10703,7 +10723,7 @@
               </a:ln>
               <a:extLst>
                 <a:ext uri="{91240B29-F687-4f45-9708-019B960494DF}">
-                  <a14:hiddenLine xmlns:a14="http://schemas.microsoft.com/office/drawing/2010/main" xmlns="" w="9525">
+                  <a14:hiddenLine xmlns="" xmlns:a14="http://schemas.microsoft.com/office/drawing/2010/main" w="9525">
                     <a:solidFill>
                       <a:srgbClr val="000000"/>
                     </a:solidFill>
@@ -10793,7 +10813,7 @@
               </a:ln>
               <a:extLst>
                 <a:ext uri="{91240B29-F687-4f45-9708-019B960494DF}">
-                  <a14:hiddenLine xmlns:a14="http://schemas.microsoft.com/office/drawing/2010/main" xmlns="" w="9525">
+                  <a14:hiddenLine xmlns="" xmlns:a14="http://schemas.microsoft.com/office/drawing/2010/main" w="9525">
                     <a:solidFill>
                       <a:srgbClr val="000000"/>
                     </a:solidFill>
@@ -10858,7 +10878,7 @@
               </a:ln>
               <a:extLst>
                 <a:ext uri="{91240B29-F687-4f45-9708-019B960494DF}">
-                  <a14:hiddenLine xmlns:a14="http://schemas.microsoft.com/office/drawing/2010/main" xmlns="" w="9525">
+                  <a14:hiddenLine xmlns="" xmlns:a14="http://schemas.microsoft.com/office/drawing/2010/main" w="9525">
                     <a:solidFill>
                       <a:srgbClr val="000000"/>
                     </a:solidFill>
@@ -10978,7 +10998,7 @@
               </a:ln>
               <a:extLst>
                 <a:ext uri="{91240B29-F687-4f45-9708-019B960494DF}">
-                  <a14:hiddenLine xmlns:a14="http://schemas.microsoft.com/office/drawing/2010/main" xmlns="" w="9525">
+                  <a14:hiddenLine xmlns="" xmlns:a14="http://schemas.microsoft.com/office/drawing/2010/main" w="9525">
                     <a:solidFill>
                       <a:srgbClr val="000000"/>
                     </a:solidFill>
@@ -11076,7 +11096,7 @@
               </a:ln>
               <a:extLst>
                 <a:ext uri="{91240B29-F687-4f45-9708-019B960494DF}">
-                  <a14:hiddenLine xmlns:a14="http://schemas.microsoft.com/office/drawing/2010/main" xmlns="" w="9525">
+                  <a14:hiddenLine xmlns="" xmlns:a14="http://schemas.microsoft.com/office/drawing/2010/main" w="9525">
                     <a:solidFill>
                       <a:srgbClr val="000000"/>
                     </a:solidFill>
@@ -11191,7 +11211,7 @@
               </a:ln>
               <a:extLst>
                 <a:ext uri="{91240B29-F687-4f45-9708-019B960494DF}">
-                  <a14:hiddenLine xmlns:a14="http://schemas.microsoft.com/office/drawing/2010/main" xmlns="" w="9525">
+                  <a14:hiddenLine xmlns="" xmlns:a14="http://schemas.microsoft.com/office/drawing/2010/main" w="9525">
                     <a:solidFill>
                       <a:srgbClr val="000000"/>
                     </a:solidFill>
@@ -11281,7 +11301,7 @@
               </a:ln>
               <a:extLst>
                 <a:ext uri="{91240B29-F687-4f45-9708-019B960494DF}">
-                  <a14:hiddenLine xmlns:a14="http://schemas.microsoft.com/office/drawing/2010/main" xmlns="" w="9525">
+                  <a14:hiddenLine xmlns="" xmlns:a14="http://schemas.microsoft.com/office/drawing/2010/main" w="9525">
                     <a:solidFill>
                       <a:srgbClr val="000000"/>
                     </a:solidFill>
@@ -11346,7 +11366,7 @@
               </a:ln>
               <a:extLst>
                 <a:ext uri="{91240B29-F687-4f45-9708-019B960494DF}">
-                  <a14:hiddenLine xmlns:a14="http://schemas.microsoft.com/office/drawing/2010/main" xmlns="" w="9525">
+                  <a14:hiddenLine xmlns="" xmlns:a14="http://schemas.microsoft.com/office/drawing/2010/main" w="9525">
                     <a:solidFill>
                       <a:srgbClr val="000000"/>
                     </a:solidFill>
@@ -11436,7 +11456,7 @@
               </a:ln>
               <a:extLst>
                 <a:ext uri="{91240B29-F687-4f45-9708-019B960494DF}">
-                  <a14:hiddenLine xmlns:a14="http://schemas.microsoft.com/office/drawing/2010/main" xmlns="" w="9525">
+                  <a14:hiddenLine xmlns="" xmlns:a14="http://schemas.microsoft.com/office/drawing/2010/main" w="9525">
                     <a:solidFill>
                       <a:srgbClr val="000000"/>
                     </a:solidFill>
@@ -11504,7 +11524,7 @@
               </a:ln>
               <a:extLst>
                 <a:ext uri="{91240B29-F687-4f45-9708-019B960494DF}">
-                  <a14:hiddenLine xmlns:a14="http://schemas.microsoft.com/office/drawing/2010/main" xmlns="" w="9525">
+                  <a14:hiddenLine xmlns="" xmlns:a14="http://schemas.microsoft.com/office/drawing/2010/main" w="9525">
                     <a:solidFill>
                       <a:srgbClr val="000000"/>
                     </a:solidFill>
@@ -11594,7 +11614,7 @@
               </a:ln>
               <a:extLst>
                 <a:ext uri="{91240B29-F687-4f45-9708-019B960494DF}">
-                  <a14:hiddenLine xmlns:a14="http://schemas.microsoft.com/office/drawing/2010/main" xmlns="" w="9525">
+                  <a14:hiddenLine xmlns="" xmlns:a14="http://schemas.microsoft.com/office/drawing/2010/main" w="9525">
                     <a:solidFill>
                       <a:srgbClr val="000000"/>
                     </a:solidFill>
@@ -11662,7 +11682,7 @@
               </a:ln>
               <a:extLst>
                 <a:ext uri="{91240B29-F687-4f45-9708-019B960494DF}">
-                  <a14:hiddenLine xmlns:a14="http://schemas.microsoft.com/office/drawing/2010/main" xmlns="" w="9525">
+                  <a14:hiddenLine xmlns="" xmlns:a14="http://schemas.microsoft.com/office/drawing/2010/main" w="9525">
                     <a:solidFill>
                       <a:srgbClr val="000000"/>
                     </a:solidFill>
@@ -11752,7 +11772,7 @@
               </a:ln>
               <a:extLst>
                 <a:ext uri="{91240B29-F687-4f45-9708-019B960494DF}">
-                  <a14:hiddenLine xmlns:a14="http://schemas.microsoft.com/office/drawing/2010/main" xmlns="" w="9525">
+                  <a14:hiddenLine xmlns="" xmlns:a14="http://schemas.microsoft.com/office/drawing/2010/main" w="9525">
                     <a:solidFill>
                       <a:srgbClr val="000000"/>
                     </a:solidFill>
@@ -11786,7 +11806,7 @@
               </a:ln>
               <a:extLst>
                 <a:ext uri="{91240B29-F687-4f45-9708-019B960494DF}">
-                  <a14:hiddenLine xmlns:a14="http://schemas.microsoft.com/office/drawing/2010/main" xmlns="" w="9525">
+                  <a14:hiddenLine xmlns="" xmlns:a14="http://schemas.microsoft.com/office/drawing/2010/main" w="9525">
                     <a:solidFill>
                       <a:srgbClr val="000000"/>
                     </a:solidFill>
@@ -11927,7 +11947,7 @@
             <a:fld id="{48A87A34-81AB-432B-8DAE-1953F412C126}" type="datetimeFigureOut">
               <a:rPr lang="en-US" dirty="0"/>
               <a:pPr/>
-              <a:t>10/9/2023</a:t>
+              <a:t>10/10/2023</a:t>
             </a:fld>
             <a:endParaRPr lang="en-US" dirty="0"/>
           </a:p>
@@ -12353,12 +12373,33 @@
             <p:ph type="ctrTitle"/>
           </p:nvPr>
         </p:nvSpPr>
-        <p:spPr/>
+        <p:spPr>
+          <a:xfrm>
+            <a:off x="1876424" y="1828799"/>
+            <a:ext cx="8791575" cy="1681163"/>
+          </a:xfrm>
+        </p:spPr>
         <p:txBody>
           <a:bodyPr/>
           <a:lstStyle/>
           <a:p>
-            <a:endParaRPr lang="en-IN"/>
+            <a:pPr algn="ctr"/>
+            <a:r>
+              <a:rPr lang="en-US" dirty="0" smtClean="0"/>
+              <a:t>FOOD SERVICE Application</a:t>
+            </a:r>
+            <a:r>
+              <a:rPr lang="en-IN" dirty="0"/>
+              <a:t/>
+            </a:r>
+            <a:br>
+              <a:rPr lang="en-IN" dirty="0"/>
+            </a:br>
+            <a:r>
+              <a:rPr lang="en-IN" dirty="0" smtClean="0"/>
+              <a:t>CAPSTONE PROJECT</a:t>
+            </a:r>
+            <a:endParaRPr lang="en-IN" dirty="0"/>
           </a:p>
         </p:txBody>
       </p:sp>
@@ -12377,7 +12418,34 @@
           <a:bodyPr/>
           <a:lstStyle/>
           <a:p>
-            <a:endParaRPr lang="en-IN"/>
+            <a:pPr algn="ctr"/>
+            <a:r>
+              <a:rPr lang="en-US" dirty="0" smtClean="0"/>
+              <a:t>-prepared By</a:t>
+            </a:r>
+          </a:p>
+          <a:p>
+            <a:pPr algn="ctr"/>
+            <a:r>
+              <a:rPr lang="en-US" cap="none" dirty="0" smtClean="0"/>
+              <a:t>Ashim </a:t>
+            </a:r>
+            <a:r>
+              <a:rPr lang="en-US" cap="none" dirty="0"/>
+              <a:t>A</a:t>
+            </a:r>
+            <a:r>
+              <a:rPr lang="en-US" cap="none" dirty="0" smtClean="0"/>
+              <a:t>akash Roy</a:t>
+            </a:r>
+          </a:p>
+          <a:p>
+            <a:pPr algn="ctr"/>
+            <a:r>
+              <a:rPr lang="en-US" cap="none" dirty="0" smtClean="0"/>
+              <a:t>Ashutosh Kumar</a:t>
+            </a:r>
+            <a:endParaRPr lang="en-IN" cap="none" dirty="0"/>
           </a:p>
         </p:txBody>
       </p:sp>
@@ -12391,6 +12459,2752 @@
   <p:clrMapOvr>
     <a:masterClrMapping/>
   </p:clrMapOvr>
+  <p:timing>
+    <p:tnLst>
+      <p:par>
+        <p:cTn id="1" dur="indefinite" restart="never" nodeType="tmRoot"/>
+      </p:par>
+    </p:tnLst>
+  </p:timing>
+</p:sld>
+</file>
+
+<file path=ppt/slides/slide10.xml><?xml version="1.0" encoding="utf-8"?>
+<p:sld xmlns:a="http://schemas.openxmlformats.org/drawingml/2006/main" xmlns:r="http://schemas.openxmlformats.org/officeDocument/2006/relationships" xmlns:p="http://schemas.openxmlformats.org/presentationml/2006/main">
+  <p:cSld>
+    <p:spTree>
+      <p:nvGrpSpPr>
+        <p:cNvPr id="1" name=""/>
+        <p:cNvGrpSpPr/>
+        <p:nvPr/>
+      </p:nvGrpSpPr>
+      <p:grpSpPr>
+        <a:xfrm>
+          <a:off x="0" y="0"/>
+          <a:ext cx="0" cy="0"/>
+          <a:chOff x="0" y="0"/>
+          <a:chExt cx="0" cy="0"/>
+        </a:xfrm>
+      </p:grpSpPr>
+      <p:sp>
+        <p:nvSpPr>
+          <p:cNvPr id="2" name="Title 1"/>
+          <p:cNvSpPr>
+            <a:spLocks noGrp="1"/>
+          </p:cNvSpPr>
+          <p:nvPr>
+            <p:ph type="title"/>
+          </p:nvPr>
+        </p:nvSpPr>
+        <p:spPr/>
+        <p:txBody>
+          <a:bodyPr/>
+          <a:lstStyle/>
+          <a:p>
+            <a:r>
+              <a:rPr lang="en-US" dirty="0" smtClean="0"/>
+              <a:t>ORDER SERVICE</a:t>
+            </a:r>
+            <a:endParaRPr lang="en-IN" dirty="0"/>
+          </a:p>
+        </p:txBody>
+      </p:sp>
+      <p:sp>
+        <p:nvSpPr>
+          <p:cNvPr id="3" name="Content Placeholder 2"/>
+          <p:cNvSpPr>
+            <a:spLocks noGrp="1"/>
+          </p:cNvSpPr>
+          <p:nvPr>
+            <p:ph sz="half" idx="1"/>
+          </p:nvPr>
+        </p:nvSpPr>
+        <p:spPr/>
+        <p:txBody>
+          <a:bodyPr>
+            <a:normAutofit fontScale="85000" lnSpcReduction="20000"/>
+          </a:bodyPr>
+          <a:lstStyle/>
+          <a:p>
+            <a:pPr marL="0" indent="0">
+              <a:buNone/>
+            </a:pPr>
+            <a:r>
+              <a:rPr lang="en-US" dirty="0" smtClean="0"/>
+              <a:t>Purpose:</a:t>
+            </a:r>
+          </a:p>
+          <a:p>
+            <a:r>
+              <a:rPr lang="en-US" dirty="0" smtClean="0"/>
+              <a:t>Place / Cancel</a:t>
+            </a:r>
+            <a:r>
+              <a:rPr lang="en-US" dirty="0" smtClean="0"/>
+              <a:t> </a:t>
+            </a:r>
+            <a:r>
+              <a:rPr lang="en-US" dirty="0" smtClean="0"/>
+              <a:t>an order</a:t>
+            </a:r>
+          </a:p>
+          <a:p>
+            <a:r>
+              <a:rPr lang="en-US" dirty="0" smtClean="0"/>
+              <a:t>Update  </a:t>
+            </a:r>
+            <a:r>
+              <a:rPr lang="en-US" dirty="0" smtClean="0"/>
+              <a:t>or remove any order by ID for a customer</a:t>
+            </a:r>
+          </a:p>
+          <a:p>
+            <a:r>
+              <a:rPr lang="en-US" dirty="0" smtClean="0"/>
+              <a:t>Add, Update or </a:t>
+            </a:r>
+            <a:r>
+              <a:rPr lang="en-US" dirty="0" smtClean="0"/>
+              <a:t>Delete </a:t>
+            </a:r>
+            <a:r>
+              <a:rPr lang="en-US" dirty="0" smtClean="0"/>
+              <a:t>food item </a:t>
+            </a:r>
+            <a:r>
+              <a:rPr lang="en-US" dirty="0" smtClean="0"/>
+              <a:t>to/from an order</a:t>
+            </a:r>
+            <a:endParaRPr lang="en-US" dirty="0" smtClean="0"/>
+          </a:p>
+          <a:p>
+            <a:r>
+              <a:rPr lang="en-US" dirty="0" smtClean="0"/>
+              <a:t>Fetch one or list of addresses for a customer</a:t>
+            </a:r>
+          </a:p>
+          <a:p>
+            <a:pPr marL="0" indent="0">
+              <a:buNone/>
+            </a:pPr>
+            <a:r>
+              <a:rPr lang="en-US" dirty="0" smtClean="0"/>
+              <a:t>Order details </a:t>
+            </a:r>
+            <a:r>
+              <a:rPr lang="en-US" dirty="0"/>
+              <a:t>are stored in Mongo DB database</a:t>
+            </a:r>
+            <a:endParaRPr lang="en-IN" dirty="0"/>
+          </a:p>
+          <a:p>
+            <a:pPr marL="0" indent="0">
+              <a:buNone/>
+            </a:pPr>
+            <a:endParaRPr lang="en-IN" dirty="0"/>
+          </a:p>
+        </p:txBody>
+      </p:sp>
+      <p:pic>
+        <p:nvPicPr>
+          <p:cNvPr id="5" name="Content Placeholder 4"/>
+          <p:cNvPicPr>
+            <a:picLocks noGrp="1" noChangeAspect="1"/>
+          </p:cNvPicPr>
+          <p:nvPr>
+            <p:ph sz="half" idx="2"/>
+          </p:nvPr>
+        </p:nvPicPr>
+        <p:blipFill>
+          <a:blip r:embed="rId2"/>
+          <a:stretch>
+            <a:fillRect/>
+          </a:stretch>
+        </p:blipFill>
+        <p:spPr>
+          <a:xfrm>
+            <a:off x="6019799" y="2249486"/>
+            <a:ext cx="5334000" cy="3536418"/>
+          </a:xfrm>
+          <a:prstGeom prst="rect">
+            <a:avLst/>
+          </a:prstGeom>
+        </p:spPr>
+      </p:pic>
+    </p:spTree>
+    <p:extLst>
+      <p:ext uri="{BB962C8B-B14F-4D97-AF65-F5344CB8AC3E}">
+        <p14:creationId xmlns:p14="http://schemas.microsoft.com/office/powerpoint/2010/main" val="2227151149"/>
+      </p:ext>
+    </p:extLst>
+  </p:cSld>
+  <p:clrMapOvr>
+    <a:masterClrMapping/>
+  </p:clrMapOvr>
+  <p:timing>
+    <p:tnLst>
+      <p:par>
+        <p:cTn id="1" dur="indefinite" restart="never" nodeType="tmRoot"/>
+      </p:par>
+    </p:tnLst>
+  </p:timing>
+</p:sld>
+</file>
+
+<file path=ppt/slides/slide11.xml><?xml version="1.0" encoding="utf-8"?>
+<p:sld xmlns:a="http://schemas.openxmlformats.org/drawingml/2006/main" xmlns:r="http://schemas.openxmlformats.org/officeDocument/2006/relationships" xmlns:p="http://schemas.openxmlformats.org/presentationml/2006/main">
+  <p:cSld>
+    <p:spTree>
+      <p:nvGrpSpPr>
+        <p:cNvPr id="1" name=""/>
+        <p:cNvGrpSpPr/>
+        <p:nvPr/>
+      </p:nvGrpSpPr>
+      <p:grpSpPr>
+        <a:xfrm>
+          <a:off x="0" y="0"/>
+          <a:ext cx="0" cy="0"/>
+          <a:chOff x="0" y="0"/>
+          <a:chExt cx="0" cy="0"/>
+        </a:xfrm>
+      </p:grpSpPr>
+      <p:sp>
+        <p:nvSpPr>
+          <p:cNvPr id="2" name="Title 1"/>
+          <p:cNvSpPr>
+            <a:spLocks noGrp="1"/>
+          </p:cNvSpPr>
+          <p:nvPr>
+            <p:ph type="title"/>
+          </p:nvPr>
+        </p:nvSpPr>
+        <p:spPr/>
+        <p:txBody>
+          <a:bodyPr/>
+          <a:lstStyle/>
+          <a:p>
+            <a:r>
+              <a:rPr lang="en-US" dirty="0" smtClean="0"/>
+              <a:t>EUREKA SERVER</a:t>
+            </a:r>
+            <a:endParaRPr lang="en-IN" dirty="0"/>
+          </a:p>
+        </p:txBody>
+      </p:sp>
+      <p:pic>
+        <p:nvPicPr>
+          <p:cNvPr id="5" name="Content Placeholder 4"/>
+          <p:cNvPicPr>
+            <a:picLocks noGrp="1" noChangeAspect="1"/>
+          </p:cNvPicPr>
+          <p:nvPr>
+            <p:ph sz="half" idx="2"/>
+          </p:nvPr>
+        </p:nvPicPr>
+        <p:blipFill>
+          <a:blip r:embed="rId2">
+            <a:extLst>
+              <a:ext uri="{28A0092B-C50C-407E-A947-70E740481C1C}">
+                <a14:useLocalDpi xmlns:a14="http://schemas.microsoft.com/office/drawing/2010/main" val="0"/>
+              </a:ext>
+            </a:extLst>
+          </a:blip>
+          <a:stretch>
+            <a:fillRect/>
+          </a:stretch>
+        </p:blipFill>
+        <p:spPr>
+          <a:xfrm>
+            <a:off x="6019800" y="2097088"/>
+            <a:ext cx="5326488" cy="3871391"/>
+          </a:xfrm>
+        </p:spPr>
+      </p:pic>
+      <p:sp>
+        <p:nvSpPr>
+          <p:cNvPr id="4" name="Content Placeholder 3"/>
+          <p:cNvSpPr>
+            <a:spLocks noGrp="1"/>
+          </p:cNvSpPr>
+          <p:nvPr>
+            <p:ph sz="half" idx="1"/>
+          </p:nvPr>
+        </p:nvSpPr>
+        <p:spPr/>
+        <p:txBody>
+          <a:bodyPr>
+            <a:normAutofit fontScale="85000" lnSpcReduction="10000"/>
+          </a:bodyPr>
+          <a:lstStyle/>
+          <a:p>
+            <a:pPr marL="0" indent="0">
+              <a:buNone/>
+            </a:pPr>
+            <a:r>
+              <a:rPr lang="en-US" dirty="0"/>
+              <a:t>Purpose: </a:t>
+            </a:r>
+          </a:p>
+          <a:p>
+            <a:r>
+              <a:rPr lang="en-US" dirty="0"/>
+              <a:t>Does not register itself as a </a:t>
+            </a:r>
+            <a:r>
+              <a:rPr lang="en-US" dirty="0" smtClean="0"/>
+              <a:t>micro-service</a:t>
+            </a:r>
+            <a:endParaRPr lang="en-US" dirty="0"/>
+          </a:p>
+          <a:p>
+            <a:r>
+              <a:rPr lang="en-US" dirty="0"/>
+              <a:t>Rather, works as service discovery</a:t>
+            </a:r>
+          </a:p>
+          <a:p>
+            <a:r>
+              <a:rPr lang="en-US" dirty="0"/>
+              <a:t>In simpler terms, keeps a track of all </a:t>
+            </a:r>
+            <a:r>
+              <a:rPr lang="en-US" dirty="0" smtClean="0"/>
+              <a:t>micro-services </a:t>
+            </a:r>
+            <a:r>
+              <a:rPr lang="en-US" dirty="0"/>
+              <a:t>present in the backend module. </a:t>
+            </a:r>
+          </a:p>
+          <a:p>
+            <a:endParaRPr lang="en-US" dirty="0"/>
+          </a:p>
+          <a:p>
+            <a:pPr marL="0" indent="0">
+              <a:buNone/>
+            </a:pPr>
+            <a:r>
+              <a:rPr lang="en-US" dirty="0"/>
+              <a:t>The annotation @EnableEurekaServer is implemented.</a:t>
+            </a:r>
+            <a:endParaRPr lang="en-IN" dirty="0"/>
+          </a:p>
+          <a:p>
+            <a:pPr marL="0" indent="0">
+              <a:buNone/>
+            </a:pPr>
+            <a:endParaRPr lang="en-IN" dirty="0"/>
+          </a:p>
+        </p:txBody>
+      </p:sp>
+    </p:spTree>
+    <p:extLst>
+      <p:ext uri="{BB962C8B-B14F-4D97-AF65-F5344CB8AC3E}">
+        <p14:creationId xmlns:p14="http://schemas.microsoft.com/office/powerpoint/2010/main" val="1587314509"/>
+      </p:ext>
+    </p:extLst>
+  </p:cSld>
+  <p:clrMapOvr>
+    <a:masterClrMapping/>
+  </p:clrMapOvr>
+  <p:timing>
+    <p:tnLst>
+      <p:par>
+        <p:cTn id="1" dur="indefinite" restart="never" nodeType="tmRoot"/>
+      </p:par>
+    </p:tnLst>
+  </p:timing>
+</p:sld>
+</file>
+
+<file path=ppt/slides/slide12.xml><?xml version="1.0" encoding="utf-8"?>
+<p:sld xmlns:a="http://schemas.openxmlformats.org/drawingml/2006/main" xmlns:r="http://schemas.openxmlformats.org/officeDocument/2006/relationships" xmlns:p="http://schemas.openxmlformats.org/presentationml/2006/main">
+  <p:cSld>
+    <p:spTree>
+      <p:nvGrpSpPr>
+        <p:cNvPr id="1" name=""/>
+        <p:cNvGrpSpPr/>
+        <p:nvPr/>
+      </p:nvGrpSpPr>
+      <p:grpSpPr>
+        <a:xfrm>
+          <a:off x="0" y="0"/>
+          <a:ext cx="0" cy="0"/>
+          <a:chOff x="0" y="0"/>
+          <a:chExt cx="0" cy="0"/>
+        </a:xfrm>
+      </p:grpSpPr>
+      <p:sp>
+        <p:nvSpPr>
+          <p:cNvPr id="2" name="Title 1"/>
+          <p:cNvSpPr>
+            <a:spLocks noGrp="1"/>
+          </p:cNvSpPr>
+          <p:nvPr>
+            <p:ph type="title"/>
+          </p:nvPr>
+        </p:nvSpPr>
+        <p:spPr/>
+        <p:txBody>
+          <a:bodyPr/>
+          <a:lstStyle/>
+          <a:p>
+            <a:r>
+              <a:rPr lang="en-US" dirty="0" smtClean="0"/>
+              <a:t>API GATEWAY</a:t>
+            </a:r>
+            <a:endParaRPr lang="en-IN" dirty="0"/>
+          </a:p>
+        </p:txBody>
+      </p:sp>
+      <p:sp>
+        <p:nvSpPr>
+          <p:cNvPr id="3" name="Content Placeholder 2"/>
+          <p:cNvSpPr>
+            <a:spLocks noGrp="1"/>
+          </p:cNvSpPr>
+          <p:nvPr>
+            <p:ph sz="half" idx="1"/>
+          </p:nvPr>
+        </p:nvSpPr>
+        <p:spPr/>
+        <p:txBody>
+          <a:bodyPr>
+            <a:normAutofit lnSpcReduction="10000"/>
+          </a:bodyPr>
+          <a:lstStyle/>
+          <a:p>
+            <a:pPr marL="0" indent="0">
+              <a:buNone/>
+            </a:pPr>
+            <a:r>
+              <a:rPr lang="en-US" dirty="0"/>
+              <a:t>Purpose:</a:t>
+            </a:r>
+          </a:p>
+          <a:p>
+            <a:r>
+              <a:rPr lang="en-US" dirty="0"/>
+              <a:t>All requests pass through API Gateway</a:t>
+            </a:r>
+          </a:p>
+          <a:p>
+            <a:r>
+              <a:rPr lang="en-US" dirty="0"/>
+              <a:t>Provide a common port number for handling all requests</a:t>
+            </a:r>
+          </a:p>
+          <a:p>
+            <a:r>
+              <a:rPr lang="en-US" dirty="0"/>
+              <a:t>Configures the routes of all the micro services</a:t>
+            </a:r>
+          </a:p>
+          <a:p>
+            <a:pPr marL="0" indent="0">
+              <a:buNone/>
+            </a:pPr>
+            <a:endParaRPr lang="en-IN" dirty="0"/>
+          </a:p>
+        </p:txBody>
+      </p:sp>
+      <p:pic>
+        <p:nvPicPr>
+          <p:cNvPr id="6" name="Content Placeholder 5"/>
+          <p:cNvPicPr>
+            <a:picLocks noGrp="1" noChangeAspect="1"/>
+          </p:cNvPicPr>
+          <p:nvPr>
+            <p:ph sz="half" idx="2"/>
+          </p:nvPr>
+        </p:nvPicPr>
+        <p:blipFill>
+          <a:blip r:embed="rId2"/>
+          <a:stretch>
+            <a:fillRect/>
+          </a:stretch>
+        </p:blipFill>
+        <p:spPr>
+          <a:xfrm>
+            <a:off x="6172198" y="2097088"/>
+            <a:ext cx="5212726" cy="3451421"/>
+          </a:xfrm>
+          <a:prstGeom prst="rect">
+            <a:avLst/>
+          </a:prstGeom>
+        </p:spPr>
+      </p:pic>
+    </p:spTree>
+    <p:extLst>
+      <p:ext uri="{BB962C8B-B14F-4D97-AF65-F5344CB8AC3E}">
+        <p14:creationId xmlns:p14="http://schemas.microsoft.com/office/powerpoint/2010/main" val="3367782536"/>
+      </p:ext>
+    </p:extLst>
+  </p:cSld>
+  <p:clrMapOvr>
+    <a:masterClrMapping/>
+  </p:clrMapOvr>
+  <p:timing>
+    <p:tnLst>
+      <p:par>
+        <p:cTn id="1" dur="indefinite" restart="never" nodeType="tmRoot"/>
+      </p:par>
+    </p:tnLst>
+  </p:timing>
+</p:sld>
+</file>
+
+<file path=ppt/slides/slide13.xml><?xml version="1.0" encoding="utf-8"?>
+<p:sld xmlns:a="http://schemas.openxmlformats.org/drawingml/2006/main" xmlns:r="http://schemas.openxmlformats.org/officeDocument/2006/relationships" xmlns:p="http://schemas.openxmlformats.org/presentationml/2006/main">
+  <p:cSld>
+    <p:spTree>
+      <p:nvGrpSpPr>
+        <p:cNvPr id="1" name=""/>
+        <p:cNvGrpSpPr/>
+        <p:nvPr/>
+      </p:nvGrpSpPr>
+      <p:grpSpPr>
+        <a:xfrm>
+          <a:off x="0" y="0"/>
+          <a:ext cx="0" cy="0"/>
+          <a:chOff x="0" y="0"/>
+          <a:chExt cx="0" cy="0"/>
+        </a:xfrm>
+      </p:grpSpPr>
+      <p:sp>
+        <p:nvSpPr>
+          <p:cNvPr id="2" name="Title 1"/>
+          <p:cNvSpPr>
+            <a:spLocks noGrp="1"/>
+          </p:cNvSpPr>
+          <p:nvPr>
+            <p:ph type="title"/>
+          </p:nvPr>
+        </p:nvSpPr>
+        <p:spPr/>
+        <p:txBody>
+          <a:bodyPr/>
+          <a:lstStyle/>
+          <a:p>
+            <a:r>
+              <a:rPr lang="en-US" dirty="0" smtClean="0"/>
+              <a:t>FRONT-END MODULE</a:t>
+            </a:r>
+            <a:endParaRPr lang="en-IN" dirty="0"/>
+          </a:p>
+        </p:txBody>
+      </p:sp>
+      <p:sp>
+        <p:nvSpPr>
+          <p:cNvPr id="3" name="Content Placeholder 2"/>
+          <p:cNvSpPr>
+            <a:spLocks noGrp="1"/>
+          </p:cNvSpPr>
+          <p:nvPr>
+            <p:ph idx="1"/>
+          </p:nvPr>
+        </p:nvSpPr>
+        <p:spPr/>
+        <p:txBody>
+          <a:bodyPr>
+            <a:normAutofit fontScale="92500" lnSpcReduction="10000"/>
+          </a:bodyPr>
+          <a:lstStyle/>
+          <a:p>
+            <a:r>
+              <a:rPr lang="en-US" dirty="0"/>
+              <a:t>Developed by using Angular, a free web based JS framework</a:t>
+            </a:r>
+          </a:p>
+          <a:p>
+            <a:r>
+              <a:rPr lang="en-US" dirty="0"/>
+              <a:t>Angular is primarily used to develop Single Page Applications (SPA)</a:t>
+            </a:r>
+          </a:p>
+          <a:p>
+            <a:pPr marL="0" indent="0">
+              <a:buNone/>
+            </a:pPr>
+            <a:endParaRPr lang="en-US" dirty="0" smtClean="0"/>
+          </a:p>
+          <a:p>
+            <a:pPr marL="0" indent="0">
+              <a:buNone/>
+            </a:pPr>
+            <a:r>
+              <a:rPr lang="en-US" dirty="0" smtClean="0"/>
+              <a:t>	WHY ANGULAR ?</a:t>
+            </a:r>
+            <a:endParaRPr lang="en-US" dirty="0"/>
+          </a:p>
+          <a:p>
+            <a:pPr marL="0" indent="0">
+              <a:buNone/>
+            </a:pPr>
+            <a:r>
+              <a:rPr lang="en-US" dirty="0" smtClean="0"/>
+              <a:t>		1. Custom Components</a:t>
+            </a:r>
+          </a:p>
+          <a:p>
+            <a:pPr marL="0" indent="0">
+              <a:buNone/>
+            </a:pPr>
+            <a:r>
+              <a:rPr lang="en-US" dirty="0"/>
+              <a:t>	</a:t>
+            </a:r>
+            <a:r>
+              <a:rPr lang="en-US" dirty="0" smtClean="0"/>
+              <a:t>	2. Dependency Injection (DI)</a:t>
+            </a:r>
+          </a:p>
+          <a:p>
+            <a:pPr marL="0" indent="0">
+              <a:buNone/>
+            </a:pPr>
+            <a:r>
+              <a:rPr lang="en-US" dirty="0"/>
+              <a:t>	</a:t>
+            </a:r>
+            <a:r>
+              <a:rPr lang="en-US" dirty="0" smtClean="0"/>
+              <a:t>	3. Device Compatibility &amp; Seamless User Experience</a:t>
+            </a:r>
+            <a:endParaRPr lang="en-IN" dirty="0"/>
+          </a:p>
+        </p:txBody>
+      </p:sp>
+    </p:spTree>
+    <p:extLst>
+      <p:ext uri="{BB962C8B-B14F-4D97-AF65-F5344CB8AC3E}">
+        <p14:creationId xmlns:p14="http://schemas.microsoft.com/office/powerpoint/2010/main" val="344240084"/>
+      </p:ext>
+    </p:extLst>
+  </p:cSld>
+  <p:clrMapOvr>
+    <a:masterClrMapping/>
+  </p:clrMapOvr>
+  <p:timing>
+    <p:tnLst>
+      <p:par>
+        <p:cTn id="1" dur="indefinite" restart="never" nodeType="tmRoot"/>
+      </p:par>
+    </p:tnLst>
+  </p:timing>
+</p:sld>
+</file>
+
+<file path=ppt/slides/slide14.xml><?xml version="1.0" encoding="utf-8"?>
+<p:sld xmlns:a="http://schemas.openxmlformats.org/drawingml/2006/main" xmlns:r="http://schemas.openxmlformats.org/officeDocument/2006/relationships" xmlns:p="http://schemas.openxmlformats.org/presentationml/2006/main">
+  <p:cSld>
+    <p:spTree>
+      <p:nvGrpSpPr>
+        <p:cNvPr id="1" name=""/>
+        <p:cNvGrpSpPr/>
+        <p:nvPr/>
+      </p:nvGrpSpPr>
+      <p:grpSpPr>
+        <a:xfrm>
+          <a:off x="0" y="0"/>
+          <a:ext cx="0" cy="0"/>
+          <a:chOff x="0" y="0"/>
+          <a:chExt cx="0" cy="0"/>
+        </a:xfrm>
+      </p:grpSpPr>
+      <p:sp>
+        <p:nvSpPr>
+          <p:cNvPr id="2" name="Title 1"/>
+          <p:cNvSpPr>
+            <a:spLocks noGrp="1"/>
+          </p:cNvSpPr>
+          <p:nvPr>
+            <p:ph type="title"/>
+          </p:nvPr>
+        </p:nvSpPr>
+        <p:spPr>
+          <a:xfrm>
+            <a:off x="685800" y="493917"/>
+            <a:ext cx="8610600" cy="1293028"/>
+          </a:xfrm>
+        </p:spPr>
+        <p:txBody>
+          <a:bodyPr/>
+          <a:lstStyle/>
+          <a:p>
+            <a:r>
+              <a:rPr lang="en-US" dirty="0" smtClean="0"/>
+              <a:t>IMPORTANT FILES</a:t>
+            </a:r>
+            <a:endParaRPr lang="en-IN" dirty="0"/>
+          </a:p>
+        </p:txBody>
+      </p:sp>
+      <p:sp>
+        <p:nvSpPr>
+          <p:cNvPr id="3" name="Content Placeholder 2"/>
+          <p:cNvSpPr>
+            <a:spLocks noGrp="1"/>
+          </p:cNvSpPr>
+          <p:nvPr>
+            <p:ph sz="half" idx="1"/>
+          </p:nvPr>
+        </p:nvSpPr>
+        <p:spPr>
+          <a:xfrm>
+            <a:off x="685800" y="1893194"/>
+            <a:ext cx="6565006" cy="4623515"/>
+          </a:xfrm>
+        </p:spPr>
+        <p:txBody>
+          <a:bodyPr>
+            <a:normAutofit fontScale="92500"/>
+          </a:bodyPr>
+          <a:lstStyle/>
+          <a:p>
+            <a:pPr>
+              <a:buFont typeface="Wingdings" panose="05000000000000000000" pitchFamily="2" charset="2"/>
+              <a:buChar char="Ø"/>
+            </a:pPr>
+            <a:r>
+              <a:rPr lang="en-US" u="sng" dirty="0"/>
+              <a:t>angular.json</a:t>
+            </a:r>
+            <a:r>
+              <a:rPr lang="en-US" dirty="0"/>
+              <a:t>: Stores information about the architecture, dependencies, build and test configurations</a:t>
+            </a:r>
+          </a:p>
+          <a:p>
+            <a:pPr>
+              <a:buFont typeface="Wingdings" panose="05000000000000000000" pitchFamily="2" charset="2"/>
+              <a:buChar char="Ø"/>
+            </a:pPr>
+            <a:r>
+              <a:rPr lang="en-US" dirty="0"/>
+              <a:t> </a:t>
+            </a:r>
+            <a:r>
+              <a:rPr lang="en-US" u="sng" dirty="0"/>
+              <a:t>package.json</a:t>
+            </a:r>
+            <a:r>
+              <a:rPr lang="en-US" dirty="0"/>
+              <a:t>: It is a file that contains information about the project and its dependencies</a:t>
+            </a:r>
+          </a:p>
+          <a:p>
+            <a:pPr>
+              <a:buFont typeface="Wingdings" panose="05000000000000000000" pitchFamily="2" charset="2"/>
+              <a:buChar char="Ø"/>
+            </a:pPr>
+            <a:r>
+              <a:rPr lang="en-US" dirty="0"/>
+              <a:t> </a:t>
+            </a:r>
+            <a:r>
+              <a:rPr lang="en-US" u="sng" dirty="0"/>
+              <a:t>tsconfig.json</a:t>
+            </a:r>
+            <a:r>
+              <a:rPr lang="en-US" dirty="0"/>
+              <a:t>: It specifies the base Typescript and Angular compiler options </a:t>
+            </a:r>
+          </a:p>
+          <a:p>
+            <a:pPr>
+              <a:buFont typeface="Wingdings" panose="05000000000000000000" pitchFamily="2" charset="2"/>
+              <a:buChar char="Ø"/>
+            </a:pPr>
+            <a:r>
+              <a:rPr lang="en-US" dirty="0"/>
+              <a:t> </a:t>
+            </a:r>
+            <a:r>
+              <a:rPr lang="en-US" u="sng" dirty="0"/>
+              <a:t>app.module.ts</a:t>
+            </a:r>
+            <a:r>
+              <a:rPr lang="en-US" dirty="0"/>
+              <a:t>: Maintains a track of all components and imports, required in the project</a:t>
+            </a:r>
+          </a:p>
+          <a:p>
+            <a:pPr>
+              <a:buFont typeface="Wingdings" panose="05000000000000000000" pitchFamily="2" charset="2"/>
+              <a:buChar char="Ø"/>
+            </a:pPr>
+            <a:r>
+              <a:rPr lang="en-US" dirty="0"/>
+              <a:t> </a:t>
+            </a:r>
+            <a:r>
+              <a:rPr lang="en-US" u="sng" dirty="0"/>
+              <a:t>app-</a:t>
+            </a:r>
+            <a:r>
+              <a:rPr lang="en-US" u="sng" dirty="0" err="1"/>
+              <a:t>routing.module.ts</a:t>
+            </a:r>
+            <a:r>
+              <a:rPr lang="en-US" dirty="0"/>
+              <a:t>: Specifies what component to be loaded, when a specific path is entered</a:t>
+            </a:r>
+          </a:p>
+          <a:p>
+            <a:pPr marL="0" indent="0">
+              <a:buNone/>
+            </a:pPr>
+            <a:endParaRPr lang="en-IN" dirty="0"/>
+          </a:p>
+        </p:txBody>
+      </p:sp>
+      <p:pic>
+        <p:nvPicPr>
+          <p:cNvPr id="5" name="Content Placeholder 4"/>
+          <p:cNvPicPr>
+            <a:picLocks noGrp="1" noChangeAspect="1"/>
+          </p:cNvPicPr>
+          <p:nvPr>
+            <p:ph sz="half" idx="2"/>
+          </p:nvPr>
+        </p:nvPicPr>
+        <p:blipFill>
+          <a:blip r:embed="rId2">
+            <a:extLst>
+              <a:ext uri="{28A0092B-C50C-407E-A947-70E740481C1C}">
+                <a14:useLocalDpi xmlns:a14="http://schemas.microsoft.com/office/drawing/2010/main" val="0"/>
+              </a:ext>
+            </a:extLst>
+          </a:blip>
+          <a:stretch>
+            <a:fillRect/>
+          </a:stretch>
+        </p:blipFill>
+        <p:spPr>
+          <a:xfrm>
+            <a:off x="7547020" y="1683914"/>
+            <a:ext cx="3606084" cy="4534769"/>
+          </a:xfrm>
+        </p:spPr>
+      </p:pic>
+    </p:spTree>
+    <p:extLst>
+      <p:ext uri="{BB962C8B-B14F-4D97-AF65-F5344CB8AC3E}">
+        <p14:creationId xmlns:p14="http://schemas.microsoft.com/office/powerpoint/2010/main" val="2586444712"/>
+      </p:ext>
+    </p:extLst>
+  </p:cSld>
+  <p:clrMapOvr>
+    <a:masterClrMapping/>
+  </p:clrMapOvr>
+  <p:timing>
+    <p:tnLst>
+      <p:par>
+        <p:cTn id="1" dur="indefinite" restart="never" nodeType="tmRoot"/>
+      </p:par>
+    </p:tnLst>
+  </p:timing>
+</p:sld>
+</file>
+
+<file path=ppt/slides/slide15.xml><?xml version="1.0" encoding="utf-8"?>
+<p:sld xmlns:a="http://schemas.openxmlformats.org/drawingml/2006/main" xmlns:r="http://schemas.openxmlformats.org/officeDocument/2006/relationships" xmlns:p="http://schemas.openxmlformats.org/presentationml/2006/main">
+  <p:cSld>
+    <p:spTree>
+      <p:nvGrpSpPr>
+        <p:cNvPr id="1" name=""/>
+        <p:cNvGrpSpPr/>
+        <p:nvPr/>
+      </p:nvGrpSpPr>
+      <p:grpSpPr>
+        <a:xfrm>
+          <a:off x="0" y="0"/>
+          <a:ext cx="0" cy="0"/>
+          <a:chOff x="0" y="0"/>
+          <a:chExt cx="0" cy="0"/>
+        </a:xfrm>
+      </p:grpSpPr>
+      <p:sp>
+        <p:nvSpPr>
+          <p:cNvPr id="2" name="Title 1"/>
+          <p:cNvSpPr>
+            <a:spLocks noGrp="1"/>
+          </p:cNvSpPr>
+          <p:nvPr>
+            <p:ph type="title"/>
+          </p:nvPr>
+        </p:nvSpPr>
+        <p:spPr/>
+        <p:txBody>
+          <a:bodyPr/>
+          <a:lstStyle/>
+          <a:p>
+            <a:r>
+              <a:rPr lang="en-US" dirty="0" smtClean="0"/>
+              <a:t>FUTURE SCOPE…</a:t>
+            </a:r>
+            <a:endParaRPr lang="en-IN" dirty="0"/>
+          </a:p>
+        </p:txBody>
+      </p:sp>
+      <p:sp>
+        <p:nvSpPr>
+          <p:cNvPr id="3" name="Content Placeholder 2"/>
+          <p:cNvSpPr>
+            <a:spLocks noGrp="1"/>
+          </p:cNvSpPr>
+          <p:nvPr>
+            <p:ph idx="1"/>
+          </p:nvPr>
+        </p:nvSpPr>
+        <p:spPr/>
+        <p:txBody>
+          <a:bodyPr/>
+          <a:lstStyle/>
+          <a:p>
+            <a:r>
+              <a:rPr lang="en-US" dirty="0" smtClean="0"/>
+              <a:t>Payment Interface, by using Payment Gateway </a:t>
+            </a:r>
+            <a:endParaRPr lang="en-US" dirty="0" smtClean="0"/>
+          </a:p>
+          <a:p>
+            <a:r>
+              <a:rPr lang="en-US" dirty="0" smtClean="0"/>
+              <a:t>E-Mail &amp; SMS notifications</a:t>
+            </a:r>
+            <a:endParaRPr lang="en-US" dirty="0" smtClean="0"/>
+          </a:p>
+          <a:p>
+            <a:r>
+              <a:rPr lang="en-US" dirty="0" smtClean="0"/>
+              <a:t>Live Order tracking, by adding Google Maps </a:t>
+            </a:r>
+          </a:p>
+          <a:p>
+            <a:r>
+              <a:rPr lang="en-US" dirty="0" smtClean="0"/>
+              <a:t>Search functionality to filter menu, based on item name or category</a:t>
+            </a:r>
+            <a:endParaRPr lang="en-IN" dirty="0"/>
+          </a:p>
+        </p:txBody>
+      </p:sp>
+    </p:spTree>
+    <p:extLst>
+      <p:ext uri="{BB962C8B-B14F-4D97-AF65-F5344CB8AC3E}">
+        <p14:creationId xmlns:p14="http://schemas.microsoft.com/office/powerpoint/2010/main" val="1170053047"/>
+      </p:ext>
+    </p:extLst>
+  </p:cSld>
+  <p:clrMapOvr>
+    <a:masterClrMapping/>
+  </p:clrMapOvr>
+</p:sld>
+</file>
+
+<file path=ppt/slides/slide16.xml><?xml version="1.0" encoding="utf-8"?>
+<p:sld xmlns:a="http://schemas.openxmlformats.org/drawingml/2006/main" xmlns:r="http://schemas.openxmlformats.org/officeDocument/2006/relationships" xmlns:p="http://schemas.openxmlformats.org/presentationml/2006/main">
+  <p:cSld>
+    <p:spTree>
+      <p:nvGrpSpPr>
+        <p:cNvPr id="1" name=""/>
+        <p:cNvGrpSpPr/>
+        <p:nvPr/>
+      </p:nvGrpSpPr>
+      <p:grpSpPr>
+        <a:xfrm>
+          <a:off x="0" y="0"/>
+          <a:ext cx="0" cy="0"/>
+          <a:chOff x="0" y="0"/>
+          <a:chExt cx="0" cy="0"/>
+        </a:xfrm>
+      </p:grpSpPr>
+      <p:pic>
+        <p:nvPicPr>
+          <p:cNvPr id="2" name="Picture 1"/>
+          <p:cNvPicPr>
+            <a:picLocks noChangeAspect="1"/>
+          </p:cNvPicPr>
+          <p:nvPr/>
+        </p:nvPicPr>
+        <p:blipFill>
+          <a:blip r:embed="rId2">
+            <a:extLst>
+              <a:ext uri="{28A0092B-C50C-407E-A947-70E740481C1C}">
+                <a14:useLocalDpi xmlns:a14="http://schemas.microsoft.com/office/drawing/2010/main" val="0"/>
+              </a:ext>
+            </a:extLst>
+          </a:blip>
+          <a:stretch>
+            <a:fillRect/>
+          </a:stretch>
+        </p:blipFill>
+        <p:spPr>
+          <a:xfrm>
+            <a:off x="2794715" y="1652339"/>
+            <a:ext cx="6568225" cy="4310579"/>
+          </a:xfrm>
+          <a:prstGeom prst="ellipse">
+            <a:avLst/>
+          </a:prstGeom>
+          <a:ln w="63500" cap="rnd">
+            <a:solidFill>
+              <a:srgbClr val="333333"/>
+            </a:solidFill>
+          </a:ln>
+          <a:effectLst>
+            <a:outerShdw blurRad="381000" dist="292100" dir="5400000" sx="-80000" sy="-18000" rotWithShape="0">
+              <a:srgbClr val="000000">
+                <a:alpha val="22000"/>
+              </a:srgbClr>
+            </a:outerShdw>
+          </a:effectLst>
+          <a:scene3d>
+            <a:camera prst="orthographicFront"/>
+            <a:lightRig rig="contrasting" dir="t">
+              <a:rot lat="0" lon="0" rev="3000000"/>
+            </a:lightRig>
+          </a:scene3d>
+          <a:sp3d contourW="7620">
+            <a:bevelT w="95250" h="31750"/>
+            <a:contourClr>
+              <a:srgbClr val="333333"/>
+            </a:contourClr>
+          </a:sp3d>
+        </p:spPr>
+      </p:pic>
+    </p:spTree>
+    <p:extLst>
+      <p:ext uri="{BB962C8B-B14F-4D97-AF65-F5344CB8AC3E}">
+        <p14:creationId xmlns:p14="http://schemas.microsoft.com/office/powerpoint/2010/main" val="3610226788"/>
+      </p:ext>
+    </p:extLst>
+  </p:cSld>
+  <p:clrMapOvr>
+    <a:masterClrMapping/>
+  </p:clrMapOvr>
+</p:sld>
+</file>
+
+<file path=ppt/slides/slide2.xml><?xml version="1.0" encoding="utf-8"?>
+<p:sld xmlns:a="http://schemas.openxmlformats.org/drawingml/2006/main" xmlns:r="http://schemas.openxmlformats.org/officeDocument/2006/relationships" xmlns:p="http://schemas.openxmlformats.org/presentationml/2006/main">
+  <p:cSld>
+    <p:spTree>
+      <p:nvGrpSpPr>
+        <p:cNvPr id="1" name=""/>
+        <p:cNvGrpSpPr/>
+        <p:nvPr/>
+      </p:nvGrpSpPr>
+      <p:grpSpPr>
+        <a:xfrm>
+          <a:off x="0" y="0"/>
+          <a:ext cx="0" cy="0"/>
+          <a:chOff x="0" y="0"/>
+          <a:chExt cx="0" cy="0"/>
+        </a:xfrm>
+      </p:grpSpPr>
+      <p:sp>
+        <p:nvSpPr>
+          <p:cNvPr id="2" name="Title 1"/>
+          <p:cNvSpPr>
+            <a:spLocks noGrp="1"/>
+          </p:cNvSpPr>
+          <p:nvPr>
+            <p:ph type="title"/>
+          </p:nvPr>
+        </p:nvSpPr>
+        <p:spPr>
+          <a:xfrm>
+            <a:off x="677773" y="592760"/>
+            <a:ext cx="9905998" cy="1478570"/>
+          </a:xfrm>
+        </p:spPr>
+        <p:txBody>
+          <a:bodyPr/>
+          <a:lstStyle/>
+          <a:p>
+            <a:r>
+              <a:rPr lang="en-US" dirty="0" smtClean="0"/>
+              <a:t>WHY BUILD A FOOD SERVICE APP</a:t>
+            </a:r>
+            <a:endParaRPr lang="en-IN" dirty="0"/>
+          </a:p>
+        </p:txBody>
+      </p:sp>
+      <p:sp>
+        <p:nvSpPr>
+          <p:cNvPr id="3" name="Content Placeholder 2"/>
+          <p:cNvSpPr>
+            <a:spLocks noGrp="1"/>
+          </p:cNvSpPr>
+          <p:nvPr>
+            <p:ph idx="1"/>
+          </p:nvPr>
+        </p:nvSpPr>
+        <p:spPr/>
+        <p:txBody>
+          <a:bodyPr/>
+          <a:lstStyle/>
+          <a:p>
+            <a:r>
+              <a:rPr lang="en-US" dirty="0" smtClean="0"/>
+              <a:t>Age of digitization and IoT</a:t>
+            </a:r>
+          </a:p>
+          <a:p>
+            <a:r>
+              <a:rPr lang="en-US" dirty="0" smtClean="0"/>
+              <a:t>Enhance the customer convenience and comfort</a:t>
+            </a:r>
+          </a:p>
+          <a:p>
+            <a:r>
+              <a:rPr lang="en-US" dirty="0" smtClean="0"/>
+              <a:t>Seamless communication between Client &amp; Server</a:t>
+            </a:r>
+          </a:p>
+          <a:p>
+            <a:endParaRPr lang="en-IN" dirty="0"/>
+          </a:p>
+        </p:txBody>
+      </p:sp>
+    </p:spTree>
+    <p:extLst>
+      <p:ext uri="{BB962C8B-B14F-4D97-AF65-F5344CB8AC3E}">
+        <p14:creationId xmlns:p14="http://schemas.microsoft.com/office/powerpoint/2010/main" val="4173838633"/>
+      </p:ext>
+    </p:extLst>
+  </p:cSld>
+  <p:clrMapOvr>
+    <a:masterClrMapping/>
+  </p:clrMapOvr>
+  <p:timing>
+    <p:tnLst>
+      <p:par>
+        <p:cTn id="1" dur="indefinite" restart="never" nodeType="tmRoot"/>
+      </p:par>
+    </p:tnLst>
+  </p:timing>
+</p:sld>
+</file>
+
+<file path=ppt/slides/slide3.xml><?xml version="1.0" encoding="utf-8"?>
+<p:sld xmlns:a="http://schemas.openxmlformats.org/drawingml/2006/main" xmlns:r="http://schemas.openxmlformats.org/officeDocument/2006/relationships" xmlns:p="http://schemas.openxmlformats.org/presentationml/2006/main">
+  <p:cSld>
+    <p:spTree>
+      <p:nvGrpSpPr>
+        <p:cNvPr id="1" name=""/>
+        <p:cNvGrpSpPr/>
+        <p:nvPr/>
+      </p:nvGrpSpPr>
+      <p:grpSpPr>
+        <a:xfrm>
+          <a:off x="0" y="0"/>
+          <a:ext cx="0" cy="0"/>
+          <a:chOff x="0" y="0"/>
+          <a:chExt cx="0" cy="0"/>
+        </a:xfrm>
+      </p:grpSpPr>
+      <p:sp>
+        <p:nvSpPr>
+          <p:cNvPr id="2" name="Title 1"/>
+          <p:cNvSpPr>
+            <a:spLocks noGrp="1"/>
+          </p:cNvSpPr>
+          <p:nvPr>
+            <p:ph type="title"/>
+          </p:nvPr>
+        </p:nvSpPr>
+        <p:spPr>
+          <a:xfrm>
+            <a:off x="701920" y="502608"/>
+            <a:ext cx="9905998" cy="1478570"/>
+          </a:xfrm>
+        </p:spPr>
+        <p:txBody>
+          <a:bodyPr/>
+          <a:lstStyle/>
+          <a:p>
+            <a:r>
+              <a:rPr lang="en-US" dirty="0" smtClean="0"/>
+              <a:t>ARCHITECTURE DIAGRAM</a:t>
+            </a:r>
+            <a:endParaRPr lang="en-IN" dirty="0"/>
+          </a:p>
+        </p:txBody>
+      </p:sp>
+      <p:pic>
+        <p:nvPicPr>
+          <p:cNvPr id="3" name="Content Placeholder 3"/>
+          <p:cNvPicPr>
+            <a:picLocks noChangeAspect="1"/>
+          </p:cNvPicPr>
+          <p:nvPr/>
+        </p:nvPicPr>
+        <p:blipFill>
+          <a:blip r:embed="rId2"/>
+          <a:stretch>
+            <a:fillRect/>
+          </a:stretch>
+        </p:blipFill>
+        <p:spPr>
+          <a:xfrm>
+            <a:off x="701920" y="2097088"/>
+            <a:ext cx="10784983" cy="4391696"/>
+          </a:xfrm>
+          <a:prstGeom prst="rect">
+            <a:avLst/>
+          </a:prstGeom>
+        </p:spPr>
+      </p:pic>
+    </p:spTree>
+    <p:extLst>
+      <p:ext uri="{BB962C8B-B14F-4D97-AF65-F5344CB8AC3E}">
+        <p14:creationId xmlns:p14="http://schemas.microsoft.com/office/powerpoint/2010/main" val="3230286422"/>
+      </p:ext>
+    </p:extLst>
+  </p:cSld>
+  <p:clrMapOvr>
+    <a:masterClrMapping/>
+  </p:clrMapOvr>
+  <p:timing>
+    <p:tnLst>
+      <p:par>
+        <p:cTn id="1" dur="indefinite" restart="never" nodeType="tmRoot"/>
+      </p:par>
+    </p:tnLst>
+  </p:timing>
+</p:sld>
+</file>
+
+<file path=ppt/slides/slide4.xml><?xml version="1.0" encoding="utf-8"?>
+<p:sld xmlns:a="http://schemas.openxmlformats.org/drawingml/2006/main" xmlns:r="http://schemas.openxmlformats.org/officeDocument/2006/relationships" xmlns:p="http://schemas.openxmlformats.org/presentationml/2006/main">
+  <p:cSld>
+    <p:spTree>
+      <p:nvGrpSpPr>
+        <p:cNvPr id="1" name=""/>
+        <p:cNvGrpSpPr/>
+        <p:nvPr/>
+      </p:nvGrpSpPr>
+      <p:grpSpPr>
+        <a:xfrm>
+          <a:off x="0" y="0"/>
+          <a:ext cx="0" cy="0"/>
+          <a:chOff x="0" y="0"/>
+          <a:chExt cx="0" cy="0"/>
+        </a:xfrm>
+      </p:grpSpPr>
+      <p:sp>
+        <p:nvSpPr>
+          <p:cNvPr id="2" name="Title 1"/>
+          <p:cNvSpPr>
+            <a:spLocks noGrp="1"/>
+          </p:cNvSpPr>
+          <p:nvPr>
+            <p:ph type="title"/>
+          </p:nvPr>
+        </p:nvSpPr>
+        <p:spPr>
+          <a:xfrm>
+            <a:off x="730965" y="392932"/>
+            <a:ext cx="10458168" cy="1303867"/>
+          </a:xfrm>
+        </p:spPr>
+        <p:txBody>
+          <a:bodyPr/>
+          <a:lstStyle/>
+          <a:p>
+            <a:r>
+              <a:rPr lang="en-US" dirty="0" smtClean="0"/>
+              <a:t>TECHNOLOGIES IMPLEMENTED</a:t>
+            </a:r>
+            <a:endParaRPr lang="en-IN" dirty="0"/>
+          </a:p>
+        </p:txBody>
+      </p:sp>
+      <p:sp>
+        <p:nvSpPr>
+          <p:cNvPr id="3" name="Text Placeholder 2"/>
+          <p:cNvSpPr>
+            <a:spLocks noGrp="1"/>
+          </p:cNvSpPr>
+          <p:nvPr>
+            <p:ph type="body" idx="1"/>
+          </p:nvPr>
+        </p:nvSpPr>
+        <p:spPr>
+          <a:xfrm>
+            <a:off x="0" y="2087136"/>
+            <a:ext cx="4364824" cy="617320"/>
+          </a:xfrm>
+        </p:spPr>
+        <p:txBody>
+          <a:bodyPr/>
+          <a:lstStyle/>
+          <a:p>
+            <a:pPr algn="ctr"/>
+            <a:r>
+              <a:rPr lang="en-US" dirty="0" smtClean="0"/>
+              <a:t>FRONT-END</a:t>
+            </a:r>
+            <a:endParaRPr lang="en-IN" dirty="0"/>
+          </a:p>
+        </p:txBody>
+      </p:sp>
+      <p:sp>
+        <p:nvSpPr>
+          <p:cNvPr id="4" name="Text Placeholder 3"/>
+          <p:cNvSpPr>
+            <a:spLocks noGrp="1"/>
+          </p:cNvSpPr>
+          <p:nvPr>
+            <p:ph type="body" sz="half" idx="15"/>
+          </p:nvPr>
+        </p:nvSpPr>
+        <p:spPr>
+          <a:xfrm>
+            <a:off x="0" y="2904564"/>
+            <a:ext cx="4366858" cy="3953435"/>
+          </a:xfrm>
+        </p:spPr>
+        <p:txBody>
+          <a:bodyPr>
+            <a:normAutofit/>
+          </a:bodyPr>
+          <a:lstStyle/>
+          <a:p>
+            <a:endParaRPr lang="en-IN" sz="1800" dirty="0"/>
+          </a:p>
+        </p:txBody>
+      </p:sp>
+      <p:sp>
+        <p:nvSpPr>
+          <p:cNvPr id="5" name="Text Placeholder 4"/>
+          <p:cNvSpPr>
+            <a:spLocks noGrp="1"/>
+          </p:cNvSpPr>
+          <p:nvPr>
+            <p:ph type="body" sz="quarter" idx="3"/>
+          </p:nvPr>
+        </p:nvSpPr>
+        <p:spPr>
+          <a:xfrm>
+            <a:off x="4367783" y="2065866"/>
+            <a:ext cx="3679950" cy="626534"/>
+          </a:xfrm>
+        </p:spPr>
+        <p:txBody>
+          <a:bodyPr/>
+          <a:lstStyle/>
+          <a:p>
+            <a:pPr algn="ctr"/>
+            <a:r>
+              <a:rPr lang="en-US" dirty="0" smtClean="0"/>
+              <a:t>BACK-END</a:t>
+            </a:r>
+            <a:endParaRPr lang="en-IN" dirty="0"/>
+          </a:p>
+        </p:txBody>
+      </p:sp>
+      <p:sp>
+        <p:nvSpPr>
+          <p:cNvPr id="6" name="Text Placeholder 5"/>
+          <p:cNvSpPr>
+            <a:spLocks noGrp="1"/>
+          </p:cNvSpPr>
+          <p:nvPr>
+            <p:ph type="body" sz="half" idx="16"/>
+          </p:nvPr>
+        </p:nvSpPr>
+        <p:spPr>
+          <a:xfrm>
+            <a:off x="4366858" y="2904067"/>
+            <a:ext cx="3684942" cy="3953932"/>
+          </a:xfrm>
+        </p:spPr>
+        <p:txBody>
+          <a:bodyPr/>
+          <a:lstStyle/>
+          <a:p>
+            <a:endParaRPr lang="en-IN" dirty="0"/>
+          </a:p>
+        </p:txBody>
+      </p:sp>
+      <p:sp>
+        <p:nvSpPr>
+          <p:cNvPr id="7" name="Text Placeholder 6"/>
+          <p:cNvSpPr>
+            <a:spLocks noGrp="1"/>
+          </p:cNvSpPr>
+          <p:nvPr>
+            <p:ph type="body" sz="quarter" idx="13"/>
+          </p:nvPr>
+        </p:nvSpPr>
+        <p:spPr>
+          <a:xfrm>
+            <a:off x="8049766" y="2065866"/>
+            <a:ext cx="4142234" cy="626534"/>
+          </a:xfrm>
+        </p:spPr>
+        <p:txBody>
+          <a:bodyPr/>
+          <a:lstStyle/>
+          <a:p>
+            <a:pPr algn="ctr"/>
+            <a:r>
+              <a:rPr lang="en-US" dirty="0" smtClean="0"/>
+              <a:t>MISCELLANEOUS</a:t>
+            </a:r>
+            <a:endParaRPr lang="en-IN" dirty="0"/>
+          </a:p>
+        </p:txBody>
+      </p:sp>
+      <p:sp>
+        <p:nvSpPr>
+          <p:cNvPr id="8" name="Text Placeholder 7"/>
+          <p:cNvSpPr>
+            <a:spLocks noGrp="1"/>
+          </p:cNvSpPr>
+          <p:nvPr>
+            <p:ph type="body" sz="half" idx="17"/>
+          </p:nvPr>
+        </p:nvSpPr>
+        <p:spPr>
+          <a:xfrm>
+            <a:off x="8051800" y="2904565"/>
+            <a:ext cx="4140200" cy="3953434"/>
+          </a:xfrm>
+        </p:spPr>
+        <p:txBody>
+          <a:bodyPr/>
+          <a:lstStyle/>
+          <a:p>
+            <a:endParaRPr lang="en-IN" dirty="0"/>
+          </a:p>
+        </p:txBody>
+      </p:sp>
+      <p:pic>
+        <p:nvPicPr>
+          <p:cNvPr id="11" name="Picture 10"/>
+          <p:cNvPicPr>
+            <a:picLocks noChangeAspect="1"/>
+          </p:cNvPicPr>
+          <p:nvPr/>
+        </p:nvPicPr>
+        <p:blipFill>
+          <a:blip r:embed="rId2">
+            <a:extLst>
+              <a:ext uri="{28A0092B-C50C-407E-A947-70E740481C1C}">
+                <a14:useLocalDpi xmlns:a14="http://schemas.microsoft.com/office/drawing/2010/main" val="0"/>
+              </a:ext>
+            </a:extLst>
+          </a:blip>
+          <a:stretch>
+            <a:fillRect/>
+          </a:stretch>
+        </p:blipFill>
+        <p:spPr>
+          <a:xfrm>
+            <a:off x="2642527" y="2994728"/>
+            <a:ext cx="1356267" cy="1326739"/>
+          </a:xfrm>
+          <a:prstGeom prst="rect">
+            <a:avLst/>
+          </a:prstGeom>
+        </p:spPr>
+      </p:pic>
+      <p:pic>
+        <p:nvPicPr>
+          <p:cNvPr id="12" name="Picture 11"/>
+          <p:cNvPicPr>
+            <a:picLocks noChangeAspect="1"/>
+          </p:cNvPicPr>
+          <p:nvPr/>
+        </p:nvPicPr>
+        <p:blipFill>
+          <a:blip r:embed="rId3" cstate="print">
+            <a:extLst>
+              <a:ext uri="{28A0092B-C50C-407E-A947-70E740481C1C}">
+                <a14:useLocalDpi xmlns:a14="http://schemas.microsoft.com/office/drawing/2010/main" val="0"/>
+              </a:ext>
+            </a:extLst>
+          </a:blip>
+          <a:stretch>
+            <a:fillRect/>
+          </a:stretch>
+        </p:blipFill>
+        <p:spPr>
+          <a:xfrm>
+            <a:off x="32547" y="2941962"/>
+            <a:ext cx="2005868" cy="1417400"/>
+          </a:xfrm>
+          <a:prstGeom prst="rect">
+            <a:avLst/>
+          </a:prstGeom>
+        </p:spPr>
+      </p:pic>
+      <p:pic>
+        <p:nvPicPr>
+          <p:cNvPr id="13" name="Picture 12"/>
+          <p:cNvPicPr>
+            <a:picLocks noChangeAspect="1"/>
+          </p:cNvPicPr>
+          <p:nvPr/>
+        </p:nvPicPr>
+        <p:blipFill>
+          <a:blip r:embed="rId4">
+            <a:extLst>
+              <a:ext uri="{28A0092B-C50C-407E-A947-70E740481C1C}">
+                <a14:useLocalDpi xmlns:a14="http://schemas.microsoft.com/office/drawing/2010/main" val="0"/>
+              </a:ext>
+            </a:extLst>
+          </a:blip>
+          <a:stretch>
+            <a:fillRect/>
+          </a:stretch>
+        </p:blipFill>
+        <p:spPr>
+          <a:xfrm>
+            <a:off x="50851" y="4444761"/>
+            <a:ext cx="2005869" cy="1506597"/>
+          </a:xfrm>
+          <a:prstGeom prst="rect">
+            <a:avLst/>
+          </a:prstGeom>
+        </p:spPr>
+      </p:pic>
+      <p:pic>
+        <p:nvPicPr>
+          <p:cNvPr id="14" name="Picture 13"/>
+          <p:cNvPicPr>
+            <a:picLocks noChangeAspect="1"/>
+          </p:cNvPicPr>
+          <p:nvPr/>
+        </p:nvPicPr>
+        <p:blipFill>
+          <a:blip r:embed="rId5" cstate="print">
+            <a:extLst>
+              <a:ext uri="{28A0092B-C50C-407E-A947-70E740481C1C}">
+                <a14:useLocalDpi xmlns:a14="http://schemas.microsoft.com/office/drawing/2010/main" val="0"/>
+              </a:ext>
+            </a:extLst>
+          </a:blip>
+          <a:stretch>
+            <a:fillRect/>
+          </a:stretch>
+        </p:blipFill>
+        <p:spPr>
+          <a:xfrm>
+            <a:off x="191619" y="6036757"/>
+            <a:ext cx="1724331" cy="733955"/>
+          </a:xfrm>
+          <a:prstGeom prst="rect">
+            <a:avLst/>
+          </a:prstGeom>
+        </p:spPr>
+      </p:pic>
+      <p:pic>
+        <p:nvPicPr>
+          <p:cNvPr id="15" name="Picture 14"/>
+          <p:cNvPicPr>
+            <a:picLocks noChangeAspect="1"/>
+          </p:cNvPicPr>
+          <p:nvPr/>
+        </p:nvPicPr>
+        <p:blipFill>
+          <a:blip r:embed="rId6" cstate="print">
+            <a:extLst>
+              <a:ext uri="{28A0092B-C50C-407E-A947-70E740481C1C}">
+                <a14:useLocalDpi xmlns:a14="http://schemas.microsoft.com/office/drawing/2010/main" val="0"/>
+              </a:ext>
+            </a:extLst>
+          </a:blip>
+          <a:stretch>
+            <a:fillRect/>
+          </a:stretch>
+        </p:blipFill>
+        <p:spPr>
+          <a:xfrm>
+            <a:off x="2724338" y="4501718"/>
+            <a:ext cx="912503" cy="940084"/>
+          </a:xfrm>
+          <a:prstGeom prst="rect">
+            <a:avLst/>
+          </a:prstGeom>
+        </p:spPr>
+      </p:pic>
+      <p:pic>
+        <p:nvPicPr>
+          <p:cNvPr id="16" name="Picture 15"/>
+          <p:cNvPicPr>
+            <a:picLocks noChangeAspect="1"/>
+          </p:cNvPicPr>
+          <p:nvPr/>
+        </p:nvPicPr>
+        <p:blipFill>
+          <a:blip r:embed="rId7" cstate="print">
+            <a:extLst>
+              <a:ext uri="{28A0092B-C50C-407E-A947-70E740481C1C}">
+                <a14:useLocalDpi xmlns:a14="http://schemas.microsoft.com/office/drawing/2010/main" val="0"/>
+              </a:ext>
+            </a:extLst>
+          </a:blip>
+          <a:stretch>
+            <a:fillRect/>
+          </a:stretch>
+        </p:blipFill>
+        <p:spPr>
+          <a:xfrm>
+            <a:off x="2650970" y="5679308"/>
+            <a:ext cx="1228345" cy="985613"/>
+          </a:xfrm>
+          <a:prstGeom prst="rect">
+            <a:avLst/>
+          </a:prstGeom>
+        </p:spPr>
+      </p:pic>
+      <p:pic>
+        <p:nvPicPr>
+          <p:cNvPr id="17" name="Picture 16"/>
+          <p:cNvPicPr>
+            <a:picLocks noChangeAspect="1"/>
+          </p:cNvPicPr>
+          <p:nvPr/>
+        </p:nvPicPr>
+        <p:blipFill>
+          <a:blip r:embed="rId8">
+            <a:extLst>
+              <a:ext uri="{28A0092B-C50C-407E-A947-70E740481C1C}">
+                <a14:useLocalDpi xmlns:a14="http://schemas.microsoft.com/office/drawing/2010/main" val="0"/>
+              </a:ext>
+            </a:extLst>
+          </a:blip>
+          <a:stretch>
+            <a:fillRect/>
+          </a:stretch>
+        </p:blipFill>
+        <p:spPr>
+          <a:xfrm>
+            <a:off x="4461908" y="2941962"/>
+            <a:ext cx="1498141" cy="1231205"/>
+          </a:xfrm>
+          <a:prstGeom prst="rect">
+            <a:avLst/>
+          </a:prstGeom>
+        </p:spPr>
+      </p:pic>
+      <p:pic>
+        <p:nvPicPr>
+          <p:cNvPr id="19" name="Picture 18"/>
+          <p:cNvPicPr>
+            <a:picLocks noChangeAspect="1"/>
+          </p:cNvPicPr>
+          <p:nvPr/>
+        </p:nvPicPr>
+        <p:blipFill>
+          <a:blip r:embed="rId9" cstate="print">
+            <a:extLst>
+              <a:ext uri="{28A0092B-C50C-407E-A947-70E740481C1C}">
+                <a14:useLocalDpi xmlns:a14="http://schemas.microsoft.com/office/drawing/2010/main" val="0"/>
+              </a:ext>
+            </a:extLst>
+          </a:blip>
+          <a:stretch>
+            <a:fillRect/>
+          </a:stretch>
+        </p:blipFill>
+        <p:spPr>
+          <a:xfrm>
+            <a:off x="6381248" y="3667917"/>
+            <a:ext cx="1563225" cy="1123463"/>
+          </a:xfrm>
+          <a:prstGeom prst="rect">
+            <a:avLst/>
+          </a:prstGeom>
+        </p:spPr>
+      </p:pic>
+      <p:pic>
+        <p:nvPicPr>
+          <p:cNvPr id="20" name="Picture 19"/>
+          <p:cNvPicPr>
+            <a:picLocks noChangeAspect="1"/>
+          </p:cNvPicPr>
+          <p:nvPr/>
+        </p:nvPicPr>
+        <p:blipFill>
+          <a:blip r:embed="rId10">
+            <a:extLst>
+              <a:ext uri="{28A0092B-C50C-407E-A947-70E740481C1C}">
+                <a14:useLocalDpi xmlns:a14="http://schemas.microsoft.com/office/drawing/2010/main" val="0"/>
+              </a:ext>
+            </a:extLst>
+          </a:blip>
+          <a:stretch>
+            <a:fillRect/>
+          </a:stretch>
+        </p:blipFill>
+        <p:spPr>
+          <a:xfrm>
+            <a:off x="4544493" y="4821204"/>
+            <a:ext cx="1836755" cy="808378"/>
+          </a:xfrm>
+          <a:prstGeom prst="rect">
+            <a:avLst/>
+          </a:prstGeom>
+        </p:spPr>
+      </p:pic>
+      <p:pic>
+        <p:nvPicPr>
+          <p:cNvPr id="21" name="Picture 20"/>
+          <p:cNvPicPr>
+            <a:picLocks noChangeAspect="1"/>
+          </p:cNvPicPr>
+          <p:nvPr/>
+        </p:nvPicPr>
+        <p:blipFill>
+          <a:blip r:embed="rId11" cstate="print">
+            <a:extLst>
+              <a:ext uri="{28A0092B-C50C-407E-A947-70E740481C1C}">
+                <a14:useLocalDpi xmlns:a14="http://schemas.microsoft.com/office/drawing/2010/main" val="0"/>
+              </a:ext>
+            </a:extLst>
+          </a:blip>
+          <a:stretch>
+            <a:fillRect/>
+          </a:stretch>
+        </p:blipFill>
+        <p:spPr>
+          <a:xfrm>
+            <a:off x="6634506" y="5504424"/>
+            <a:ext cx="1164035" cy="1160497"/>
+          </a:xfrm>
+          <a:prstGeom prst="rect">
+            <a:avLst/>
+          </a:prstGeom>
+        </p:spPr>
+      </p:pic>
+      <p:pic>
+        <p:nvPicPr>
+          <p:cNvPr id="22" name="Picture 21"/>
+          <p:cNvPicPr>
+            <a:picLocks noChangeAspect="1"/>
+          </p:cNvPicPr>
+          <p:nvPr/>
+        </p:nvPicPr>
+        <p:blipFill>
+          <a:blip r:embed="rId12">
+            <a:extLst>
+              <a:ext uri="{28A0092B-C50C-407E-A947-70E740481C1C}">
+                <a14:useLocalDpi xmlns:a14="http://schemas.microsoft.com/office/drawing/2010/main" val="0"/>
+              </a:ext>
+            </a:extLst>
+          </a:blip>
+          <a:stretch>
+            <a:fillRect/>
+          </a:stretch>
+        </p:blipFill>
+        <p:spPr>
+          <a:xfrm>
+            <a:off x="8120945" y="2932439"/>
+            <a:ext cx="1837917" cy="1470956"/>
+          </a:xfrm>
+          <a:prstGeom prst="rect">
+            <a:avLst/>
+          </a:prstGeom>
+        </p:spPr>
+      </p:pic>
+      <p:pic>
+        <p:nvPicPr>
+          <p:cNvPr id="23" name="Picture 22"/>
+          <p:cNvPicPr>
+            <a:picLocks noChangeAspect="1"/>
+          </p:cNvPicPr>
+          <p:nvPr/>
+        </p:nvPicPr>
+        <p:blipFill>
+          <a:blip r:embed="rId13">
+            <a:extLst>
+              <a:ext uri="{28A0092B-C50C-407E-A947-70E740481C1C}">
+                <a14:useLocalDpi xmlns:a14="http://schemas.microsoft.com/office/drawing/2010/main" val="0"/>
+              </a:ext>
+            </a:extLst>
+          </a:blip>
+          <a:stretch>
+            <a:fillRect/>
+          </a:stretch>
+        </p:blipFill>
+        <p:spPr>
+          <a:xfrm>
+            <a:off x="9099108" y="4704324"/>
+            <a:ext cx="2226023" cy="1600200"/>
+          </a:xfrm>
+          <a:prstGeom prst="rect">
+            <a:avLst/>
+          </a:prstGeom>
+        </p:spPr>
+      </p:pic>
+      <p:cxnSp>
+        <p:nvCxnSpPr>
+          <p:cNvPr id="27" name="Straight Connector 26"/>
+          <p:cNvCxnSpPr/>
+          <p:nvPr/>
+        </p:nvCxnSpPr>
+        <p:spPr>
+          <a:xfrm>
+            <a:off x="4366858" y="1872788"/>
+            <a:ext cx="0" cy="5114866"/>
+          </a:xfrm>
+          <a:prstGeom prst="line">
+            <a:avLst/>
+          </a:prstGeom>
+          <a:ln>
+            <a:solidFill>
+              <a:schemeClr val="tx1"/>
+            </a:solidFill>
+          </a:ln>
+        </p:spPr>
+        <p:style>
+          <a:lnRef idx="3">
+            <a:schemeClr val="dk1"/>
+          </a:lnRef>
+          <a:fillRef idx="0">
+            <a:schemeClr val="dk1"/>
+          </a:fillRef>
+          <a:effectRef idx="2">
+            <a:schemeClr val="dk1"/>
+          </a:effectRef>
+          <a:fontRef idx="minor">
+            <a:schemeClr val="tx1"/>
+          </a:fontRef>
+        </p:style>
+      </p:cxnSp>
+      <p:cxnSp>
+        <p:nvCxnSpPr>
+          <p:cNvPr id="33" name="Straight Connector 32"/>
+          <p:cNvCxnSpPr/>
+          <p:nvPr/>
+        </p:nvCxnSpPr>
+        <p:spPr>
+          <a:xfrm flipV="1">
+            <a:off x="8049766" y="1977059"/>
+            <a:ext cx="0" cy="4880941"/>
+          </a:xfrm>
+          <a:prstGeom prst="line">
+            <a:avLst/>
+          </a:prstGeom>
+          <a:ln>
+            <a:solidFill>
+              <a:schemeClr val="tx1"/>
+            </a:solidFill>
+          </a:ln>
+        </p:spPr>
+        <p:style>
+          <a:lnRef idx="1">
+            <a:schemeClr val="accent1"/>
+          </a:lnRef>
+          <a:fillRef idx="0">
+            <a:schemeClr val="accent1"/>
+          </a:fillRef>
+          <a:effectRef idx="0">
+            <a:schemeClr val="accent1"/>
+          </a:effectRef>
+          <a:fontRef idx="minor">
+            <a:schemeClr val="tx1"/>
+          </a:fontRef>
+        </p:style>
+      </p:cxnSp>
+    </p:spTree>
+    <p:extLst>
+      <p:ext uri="{BB962C8B-B14F-4D97-AF65-F5344CB8AC3E}">
+        <p14:creationId xmlns:p14="http://schemas.microsoft.com/office/powerpoint/2010/main" val="3321406490"/>
+      </p:ext>
+    </p:extLst>
+  </p:cSld>
+  <p:clrMapOvr>
+    <a:masterClrMapping/>
+  </p:clrMapOvr>
+  <p:timing>
+    <p:tnLst>
+      <p:par>
+        <p:cTn id="1" dur="indefinite" restart="never" nodeType="tmRoot"/>
+      </p:par>
+    </p:tnLst>
+  </p:timing>
+</p:sld>
+</file>
+
+<file path=ppt/slides/slide5.xml><?xml version="1.0" encoding="utf-8"?>
+<p:sld xmlns:a="http://schemas.openxmlformats.org/drawingml/2006/main" xmlns:r="http://schemas.openxmlformats.org/officeDocument/2006/relationships" xmlns:p="http://schemas.openxmlformats.org/presentationml/2006/main">
+  <p:cSld>
+    <p:spTree>
+      <p:nvGrpSpPr>
+        <p:cNvPr id="1" name=""/>
+        <p:cNvGrpSpPr/>
+        <p:nvPr/>
+      </p:nvGrpSpPr>
+      <p:grpSpPr>
+        <a:xfrm>
+          <a:off x="0" y="0"/>
+          <a:ext cx="0" cy="0"/>
+          <a:chOff x="0" y="0"/>
+          <a:chExt cx="0" cy="0"/>
+        </a:xfrm>
+      </p:grpSpPr>
+      <p:sp>
+        <p:nvSpPr>
+          <p:cNvPr id="2" name="Title 1"/>
+          <p:cNvSpPr>
+            <a:spLocks noGrp="1"/>
+          </p:cNvSpPr>
+          <p:nvPr>
+            <p:ph type="title"/>
+          </p:nvPr>
+        </p:nvSpPr>
+        <p:spPr>
+          <a:xfrm>
+            <a:off x="693312" y="622704"/>
+            <a:ext cx="8610600" cy="1293028"/>
+          </a:xfrm>
+        </p:spPr>
+        <p:txBody>
+          <a:bodyPr/>
+          <a:lstStyle/>
+          <a:p>
+            <a:r>
+              <a:rPr lang="en-US" dirty="0" smtClean="0"/>
+              <a:t>BACK-END MODULE</a:t>
+            </a:r>
+            <a:endParaRPr lang="en-IN" dirty="0"/>
+          </a:p>
+        </p:txBody>
+      </p:sp>
+      <p:sp>
+        <p:nvSpPr>
+          <p:cNvPr id="3" name="Content Placeholder 2"/>
+          <p:cNvSpPr>
+            <a:spLocks noGrp="1"/>
+          </p:cNvSpPr>
+          <p:nvPr>
+            <p:ph idx="1"/>
+          </p:nvPr>
+        </p:nvSpPr>
+        <p:spPr>
+          <a:xfrm>
+            <a:off x="296214" y="2194559"/>
+            <a:ext cx="11050073" cy="4309271"/>
+          </a:xfrm>
+        </p:spPr>
+        <p:txBody>
+          <a:bodyPr>
+            <a:normAutofit fontScale="70000" lnSpcReduction="20000"/>
+          </a:bodyPr>
+          <a:lstStyle/>
+          <a:p>
+            <a:r>
+              <a:rPr lang="en-US" sz="2900" dirty="0" smtClean="0"/>
+              <a:t>Implements Spring Boot as the web based framework of JAVA</a:t>
+            </a:r>
+          </a:p>
+          <a:p>
+            <a:r>
+              <a:rPr lang="en-US" sz="2900" dirty="0" smtClean="0"/>
+              <a:t>Follows Micro-service based architecture</a:t>
+            </a:r>
+          </a:p>
+          <a:p>
+            <a:endParaRPr lang="en-US" dirty="0"/>
+          </a:p>
+          <a:p>
+            <a:pPr marL="0" indent="0">
+              <a:buNone/>
+            </a:pPr>
+            <a:r>
+              <a:rPr lang="en-US" dirty="0" smtClean="0"/>
+              <a:t>	Micro-services included in Backend module: </a:t>
+            </a:r>
+          </a:p>
+          <a:p>
+            <a:pPr marL="0" indent="0">
+              <a:buNone/>
+            </a:pPr>
+            <a:r>
+              <a:rPr lang="en-US" dirty="0" smtClean="0"/>
+              <a:t>		1. </a:t>
+            </a:r>
+            <a:r>
+              <a:rPr lang="en-US" dirty="0" smtClean="0"/>
+              <a:t>Customer Auth </a:t>
+            </a:r>
+            <a:r>
+              <a:rPr lang="en-US" dirty="0" smtClean="0"/>
+              <a:t>(Port# 8081)</a:t>
+            </a:r>
+          </a:p>
+          <a:p>
+            <a:pPr marL="0" indent="0">
+              <a:buNone/>
+            </a:pPr>
+            <a:r>
+              <a:rPr lang="en-US" dirty="0" smtClean="0"/>
+              <a:t>		2. </a:t>
+            </a:r>
+            <a:r>
+              <a:rPr lang="en-US" dirty="0" smtClean="0"/>
+              <a:t>Customer Service </a:t>
+            </a:r>
+            <a:r>
+              <a:rPr lang="en-US" dirty="0" smtClean="0"/>
+              <a:t>(Port# 8082)</a:t>
+            </a:r>
+          </a:p>
+          <a:p>
+            <a:pPr marL="0" indent="0">
+              <a:buNone/>
+            </a:pPr>
+            <a:r>
+              <a:rPr lang="en-US" dirty="0" smtClean="0"/>
+              <a:t>		3. Restaurant Service (Port# 8083)</a:t>
+            </a:r>
+          </a:p>
+          <a:p>
+            <a:pPr marL="0" indent="0">
+              <a:buNone/>
+            </a:pPr>
+            <a:r>
+              <a:rPr lang="en-US" dirty="0" smtClean="0"/>
+              <a:t>		4. Order Service (Port# 8084</a:t>
+            </a:r>
+            <a:r>
+              <a:rPr lang="en-US" dirty="0" smtClean="0"/>
+              <a:t>)</a:t>
+            </a:r>
+          </a:p>
+          <a:p>
+            <a:pPr marL="0" indent="0">
+              <a:buNone/>
+            </a:pPr>
+            <a:r>
+              <a:rPr lang="en-US" dirty="0"/>
+              <a:t>	</a:t>
+            </a:r>
+            <a:r>
+              <a:rPr lang="en-US" dirty="0" smtClean="0"/>
+              <a:t>	5. Payment </a:t>
+            </a:r>
+            <a:r>
+              <a:rPr lang="en-US" dirty="0"/>
+              <a:t>Service (Port# </a:t>
+            </a:r>
+            <a:r>
+              <a:rPr lang="en-US" dirty="0" smtClean="0"/>
+              <a:t>8085)</a:t>
+            </a:r>
+            <a:endParaRPr lang="en-US" dirty="0" smtClean="0"/>
+          </a:p>
+          <a:p>
+            <a:pPr marL="0" indent="0">
+              <a:buNone/>
+            </a:pPr>
+            <a:r>
+              <a:rPr lang="en-US" dirty="0" smtClean="0"/>
+              <a:t>		</a:t>
+            </a:r>
+            <a:r>
+              <a:rPr lang="en-US" dirty="0" smtClean="0"/>
+              <a:t>6. </a:t>
+            </a:r>
+            <a:r>
+              <a:rPr lang="en-US" dirty="0" smtClean="0"/>
+              <a:t>Eureka Server (Port# 8761)</a:t>
+            </a:r>
+          </a:p>
+          <a:p>
+            <a:pPr marL="0" indent="0">
+              <a:buNone/>
+            </a:pPr>
+            <a:r>
+              <a:rPr lang="en-US" dirty="0" smtClean="0"/>
+              <a:t>		</a:t>
+            </a:r>
+            <a:r>
+              <a:rPr lang="en-US" dirty="0" smtClean="0"/>
+              <a:t>7. </a:t>
+            </a:r>
+            <a:r>
+              <a:rPr lang="en-US" dirty="0" smtClean="0"/>
+              <a:t>API Gateway (Port# 9000)</a:t>
+            </a:r>
+            <a:endParaRPr lang="en-US" dirty="0"/>
+          </a:p>
+          <a:p>
+            <a:pPr marL="0" indent="0">
+              <a:buNone/>
+            </a:pPr>
+            <a:endParaRPr lang="en-IN" dirty="0"/>
+          </a:p>
+        </p:txBody>
+      </p:sp>
+    </p:spTree>
+    <p:extLst>
+      <p:ext uri="{BB962C8B-B14F-4D97-AF65-F5344CB8AC3E}">
+        <p14:creationId xmlns:p14="http://schemas.microsoft.com/office/powerpoint/2010/main" val="1889260042"/>
+      </p:ext>
+    </p:extLst>
+  </p:cSld>
+  <p:clrMapOvr>
+    <a:masterClrMapping/>
+  </p:clrMapOvr>
+  <p:timing>
+    <p:tnLst>
+      <p:par>
+        <p:cTn id="1" dur="indefinite" restart="never" nodeType="tmRoot"/>
+      </p:par>
+    </p:tnLst>
+  </p:timing>
+</p:sld>
+</file>
+
+<file path=ppt/slides/slide6.xml><?xml version="1.0" encoding="utf-8"?>
+<p:sld xmlns:a="http://schemas.openxmlformats.org/drawingml/2006/main" xmlns:r="http://schemas.openxmlformats.org/officeDocument/2006/relationships" xmlns:p="http://schemas.openxmlformats.org/presentationml/2006/main">
+  <p:cSld>
+    <p:spTree>
+      <p:nvGrpSpPr>
+        <p:cNvPr id="1" name=""/>
+        <p:cNvGrpSpPr/>
+        <p:nvPr/>
+      </p:nvGrpSpPr>
+      <p:grpSpPr>
+        <a:xfrm>
+          <a:off x="0" y="0"/>
+          <a:ext cx="0" cy="0"/>
+          <a:chOff x="0" y="0"/>
+          <a:chExt cx="0" cy="0"/>
+        </a:xfrm>
+      </p:grpSpPr>
+      <p:sp>
+        <p:nvSpPr>
+          <p:cNvPr id="2" name="Title 1"/>
+          <p:cNvSpPr>
+            <a:spLocks noGrp="1"/>
+          </p:cNvSpPr>
+          <p:nvPr>
+            <p:ph type="title"/>
+          </p:nvPr>
+        </p:nvSpPr>
+        <p:spPr>
+          <a:xfrm>
+            <a:off x="667555" y="416644"/>
+            <a:ext cx="8610600" cy="1293028"/>
+          </a:xfrm>
+        </p:spPr>
+        <p:txBody>
+          <a:bodyPr/>
+          <a:lstStyle/>
+          <a:p>
+            <a:r>
+              <a:rPr lang="en-US" dirty="0" smtClean="0"/>
+              <a:t>IMPORTANT FILES </a:t>
+            </a:r>
+            <a:endParaRPr lang="en-IN" dirty="0"/>
+          </a:p>
+        </p:txBody>
+      </p:sp>
+      <p:sp>
+        <p:nvSpPr>
+          <p:cNvPr id="3" name="Content Placeholder 2"/>
+          <p:cNvSpPr>
+            <a:spLocks noGrp="1"/>
+          </p:cNvSpPr>
+          <p:nvPr>
+            <p:ph idx="1"/>
+          </p:nvPr>
+        </p:nvSpPr>
+        <p:spPr>
+          <a:xfrm>
+            <a:off x="775952" y="1709672"/>
+            <a:ext cx="10820400" cy="4024125"/>
+          </a:xfrm>
+        </p:spPr>
+        <p:txBody>
+          <a:bodyPr/>
+          <a:lstStyle/>
+          <a:p>
+            <a:pPr>
+              <a:buFont typeface="Wingdings" panose="05000000000000000000" pitchFamily="2" charset="2"/>
+              <a:buChar char="Ø"/>
+            </a:pPr>
+            <a:r>
+              <a:rPr lang="en-US" dirty="0"/>
+              <a:t> </a:t>
+            </a:r>
+            <a:r>
+              <a:rPr lang="en-US" u="sng" dirty="0"/>
+              <a:t>Dockerfile</a:t>
+            </a:r>
+            <a:r>
+              <a:rPr lang="en-US" dirty="0"/>
+              <a:t>:  It is a document containing all the commands the user requires to call on the command line to assemble an image</a:t>
+            </a:r>
+          </a:p>
+          <a:p>
+            <a:pPr>
+              <a:buFont typeface="Wingdings" panose="05000000000000000000" pitchFamily="2" charset="2"/>
+              <a:buChar char="Ø"/>
+            </a:pPr>
+            <a:r>
+              <a:rPr lang="en-US" dirty="0"/>
+              <a:t> </a:t>
+            </a:r>
+            <a:r>
+              <a:rPr lang="en-US" u="sng" dirty="0"/>
+              <a:t>application.yml</a:t>
+            </a:r>
+            <a:r>
+              <a:rPr lang="en-US" dirty="0"/>
+              <a:t>: It is primarily used to modify configuration parameters, such as connectivity with database, port number, eureka registry etc.</a:t>
+            </a:r>
+          </a:p>
+          <a:p>
+            <a:pPr>
+              <a:buFont typeface="Wingdings" panose="05000000000000000000" pitchFamily="2" charset="2"/>
+              <a:buChar char="Ø"/>
+            </a:pPr>
+            <a:r>
+              <a:rPr lang="en-US" dirty="0"/>
+              <a:t> </a:t>
+            </a:r>
+            <a:r>
+              <a:rPr lang="en-US" u="sng" dirty="0"/>
+              <a:t>pom.xml</a:t>
+            </a:r>
+            <a:r>
+              <a:rPr lang="en-US" dirty="0"/>
+              <a:t>:  It is used to keep a track of project details such as group ID, artifact ID, and also all the list of dependencies required </a:t>
+            </a:r>
+          </a:p>
+          <a:p>
+            <a:pPr>
+              <a:buFont typeface="Wingdings" panose="05000000000000000000" pitchFamily="2" charset="2"/>
+              <a:buChar char="Ø"/>
+            </a:pPr>
+            <a:r>
+              <a:rPr lang="en-US" dirty="0"/>
+              <a:t> </a:t>
+            </a:r>
+            <a:r>
+              <a:rPr lang="en-US" u="sng" dirty="0"/>
+              <a:t>compose.yaml</a:t>
+            </a:r>
+            <a:r>
+              <a:rPr lang="en-US" dirty="0"/>
+              <a:t>: It is used to run multi-container docker application. </a:t>
+            </a:r>
+          </a:p>
+          <a:p>
+            <a:pPr marL="0" indent="0">
+              <a:buNone/>
+            </a:pPr>
+            <a:endParaRPr lang="en-IN" dirty="0"/>
+          </a:p>
+        </p:txBody>
+      </p:sp>
+    </p:spTree>
+    <p:extLst>
+      <p:ext uri="{BB962C8B-B14F-4D97-AF65-F5344CB8AC3E}">
+        <p14:creationId xmlns:p14="http://schemas.microsoft.com/office/powerpoint/2010/main" val="1171950637"/>
+      </p:ext>
+    </p:extLst>
+  </p:cSld>
+  <p:clrMapOvr>
+    <a:masterClrMapping/>
+  </p:clrMapOvr>
+  <p:timing>
+    <p:tnLst>
+      <p:par>
+        <p:cTn id="1" dur="indefinite" restart="never" nodeType="tmRoot"/>
+      </p:par>
+    </p:tnLst>
+  </p:timing>
+</p:sld>
+</file>
+
+<file path=ppt/slides/slide7.xml><?xml version="1.0" encoding="utf-8"?>
+<p:sld xmlns:a="http://schemas.openxmlformats.org/drawingml/2006/main" xmlns:r="http://schemas.openxmlformats.org/officeDocument/2006/relationships" xmlns:p="http://schemas.openxmlformats.org/presentationml/2006/main">
+  <p:cSld>
+    <p:spTree>
+      <p:nvGrpSpPr>
+        <p:cNvPr id="1" name=""/>
+        <p:cNvGrpSpPr/>
+        <p:nvPr/>
+      </p:nvGrpSpPr>
+      <p:grpSpPr>
+        <a:xfrm>
+          <a:off x="0" y="0"/>
+          <a:ext cx="0" cy="0"/>
+          <a:chOff x="0" y="0"/>
+          <a:chExt cx="0" cy="0"/>
+        </a:xfrm>
+      </p:grpSpPr>
+      <p:sp>
+        <p:nvSpPr>
+          <p:cNvPr id="2" name="Title 1"/>
+          <p:cNvSpPr>
+            <a:spLocks noGrp="1"/>
+          </p:cNvSpPr>
+          <p:nvPr>
+            <p:ph type="title"/>
+          </p:nvPr>
+        </p:nvSpPr>
+        <p:spPr/>
+        <p:txBody>
+          <a:bodyPr/>
+          <a:lstStyle/>
+          <a:p>
+            <a:r>
+              <a:rPr lang="en-US" dirty="0" smtClean="0"/>
+              <a:t>CUSTOMER AUTH</a:t>
+            </a:r>
+            <a:endParaRPr lang="en-IN" dirty="0"/>
+          </a:p>
+        </p:txBody>
+      </p:sp>
+      <p:sp>
+        <p:nvSpPr>
+          <p:cNvPr id="3" name="Content Placeholder 2"/>
+          <p:cNvSpPr>
+            <a:spLocks noGrp="1"/>
+          </p:cNvSpPr>
+          <p:nvPr>
+            <p:ph sz="half" idx="1"/>
+          </p:nvPr>
+        </p:nvSpPr>
+        <p:spPr>
+          <a:xfrm>
+            <a:off x="685800" y="2194559"/>
+            <a:ext cx="5334000" cy="4438061"/>
+          </a:xfrm>
+        </p:spPr>
+        <p:txBody>
+          <a:bodyPr/>
+          <a:lstStyle/>
+          <a:p>
+            <a:pPr marL="0" indent="0">
+              <a:buNone/>
+            </a:pPr>
+            <a:r>
+              <a:rPr lang="en-US" dirty="0"/>
+              <a:t>Purpose:</a:t>
+            </a:r>
+          </a:p>
+          <a:p>
+            <a:r>
+              <a:rPr lang="en-US" dirty="0"/>
+              <a:t>Allows new Users to register</a:t>
+            </a:r>
+          </a:p>
+          <a:p>
+            <a:r>
+              <a:rPr lang="en-US" dirty="0"/>
+              <a:t>Allows registered user to login</a:t>
+            </a:r>
+          </a:p>
+          <a:p>
+            <a:r>
+              <a:rPr lang="en-US" dirty="0"/>
+              <a:t>Generates a JSON Web Token (JWT), whenever a registered user logs in</a:t>
+            </a:r>
+          </a:p>
+          <a:p>
+            <a:endParaRPr lang="en-US" dirty="0"/>
+          </a:p>
+          <a:p>
+            <a:pPr marL="0" indent="0">
+              <a:buNone/>
+            </a:pPr>
+            <a:r>
+              <a:rPr lang="en-US" dirty="0" smtClean="0"/>
+              <a:t>Customer Details </a:t>
+            </a:r>
+            <a:r>
+              <a:rPr lang="en-US" dirty="0"/>
+              <a:t>are stored in MySQL Database</a:t>
+            </a:r>
+          </a:p>
+          <a:p>
+            <a:pPr marL="0" indent="0">
+              <a:buNone/>
+            </a:pPr>
+            <a:endParaRPr lang="en-IN" dirty="0"/>
+          </a:p>
+        </p:txBody>
+      </p:sp>
+      <p:pic>
+        <p:nvPicPr>
+          <p:cNvPr id="5" name="Content Placeholder 4"/>
+          <p:cNvPicPr>
+            <a:picLocks noGrp="1" noChangeAspect="1"/>
+          </p:cNvPicPr>
+          <p:nvPr>
+            <p:ph sz="half" idx="2"/>
+          </p:nvPr>
+        </p:nvPicPr>
+        <p:blipFill>
+          <a:blip r:embed="rId2"/>
+          <a:stretch>
+            <a:fillRect/>
+          </a:stretch>
+        </p:blipFill>
+        <p:spPr>
+          <a:xfrm>
+            <a:off x="5743976" y="1906073"/>
+            <a:ext cx="5628069" cy="3600017"/>
+          </a:xfrm>
+          <a:prstGeom prst="rect">
+            <a:avLst/>
+          </a:prstGeom>
+        </p:spPr>
+      </p:pic>
+    </p:spTree>
+    <p:extLst>
+      <p:ext uri="{BB962C8B-B14F-4D97-AF65-F5344CB8AC3E}">
+        <p14:creationId xmlns:p14="http://schemas.microsoft.com/office/powerpoint/2010/main" val="628617844"/>
+      </p:ext>
+    </p:extLst>
+  </p:cSld>
+  <p:clrMapOvr>
+    <a:masterClrMapping/>
+  </p:clrMapOvr>
+  <p:timing>
+    <p:tnLst>
+      <p:par>
+        <p:cTn id="1" dur="indefinite" restart="never" nodeType="tmRoot"/>
+      </p:par>
+    </p:tnLst>
+  </p:timing>
+</p:sld>
+</file>
+
+<file path=ppt/slides/slide8.xml><?xml version="1.0" encoding="utf-8"?>
+<p:sld xmlns:a="http://schemas.openxmlformats.org/drawingml/2006/main" xmlns:r="http://schemas.openxmlformats.org/officeDocument/2006/relationships" xmlns:p="http://schemas.openxmlformats.org/presentationml/2006/main">
+  <p:cSld>
+    <p:spTree>
+      <p:nvGrpSpPr>
+        <p:cNvPr id="1" name=""/>
+        <p:cNvGrpSpPr/>
+        <p:nvPr/>
+      </p:nvGrpSpPr>
+      <p:grpSpPr>
+        <a:xfrm>
+          <a:off x="0" y="0"/>
+          <a:ext cx="0" cy="0"/>
+          <a:chOff x="0" y="0"/>
+          <a:chExt cx="0" cy="0"/>
+        </a:xfrm>
+      </p:grpSpPr>
+      <p:sp>
+        <p:nvSpPr>
+          <p:cNvPr id="2" name="Title 1"/>
+          <p:cNvSpPr>
+            <a:spLocks noGrp="1"/>
+          </p:cNvSpPr>
+          <p:nvPr>
+            <p:ph type="title"/>
+          </p:nvPr>
+        </p:nvSpPr>
+        <p:spPr/>
+        <p:txBody>
+          <a:bodyPr/>
+          <a:lstStyle/>
+          <a:p>
+            <a:r>
+              <a:rPr lang="en-US" dirty="0" smtClean="0"/>
+              <a:t>CUSTOMER SERVICE</a:t>
+            </a:r>
+            <a:endParaRPr lang="en-IN" dirty="0"/>
+          </a:p>
+        </p:txBody>
+      </p:sp>
+      <p:sp>
+        <p:nvSpPr>
+          <p:cNvPr id="3" name="Content Placeholder 2"/>
+          <p:cNvSpPr>
+            <a:spLocks noGrp="1"/>
+          </p:cNvSpPr>
+          <p:nvPr>
+            <p:ph sz="half" idx="1"/>
+          </p:nvPr>
+        </p:nvSpPr>
+        <p:spPr/>
+        <p:txBody>
+          <a:bodyPr>
+            <a:normAutofit fontScale="85000" lnSpcReduction="20000"/>
+          </a:bodyPr>
+          <a:lstStyle/>
+          <a:p>
+            <a:pPr marL="0" indent="0">
+              <a:buNone/>
+            </a:pPr>
+            <a:r>
+              <a:rPr lang="en-US" dirty="0" smtClean="0"/>
+              <a:t>Purpose:</a:t>
+            </a:r>
+          </a:p>
+          <a:p>
+            <a:r>
+              <a:rPr lang="en-US" dirty="0"/>
+              <a:t>Fetch </a:t>
+            </a:r>
+            <a:r>
+              <a:rPr lang="en-US" dirty="0" smtClean="0"/>
+              <a:t>customer </a:t>
+            </a:r>
+            <a:r>
+              <a:rPr lang="en-US" dirty="0"/>
+              <a:t>by </a:t>
+            </a:r>
+            <a:r>
+              <a:rPr lang="en-US" dirty="0" smtClean="0"/>
+              <a:t>email or list of all customers</a:t>
+            </a:r>
+          </a:p>
+          <a:p>
+            <a:r>
+              <a:rPr lang="en-US" dirty="0" smtClean="0"/>
+              <a:t>Update or delete customer by email</a:t>
+            </a:r>
+          </a:p>
+          <a:p>
+            <a:r>
+              <a:rPr lang="en-US" dirty="0" smtClean="0"/>
+              <a:t>Add restaurant or view one or all restaurant for customer</a:t>
+            </a:r>
+          </a:p>
+          <a:p>
+            <a:pPr marL="0" indent="0">
+              <a:buNone/>
+            </a:pPr>
+            <a:endParaRPr lang="en-US" dirty="0"/>
+          </a:p>
+          <a:p>
+            <a:pPr marL="0" indent="0">
+              <a:buNone/>
+            </a:pPr>
+            <a:r>
+              <a:rPr lang="en-US" dirty="0" smtClean="0"/>
+              <a:t>Customer details are stored in Mongo DB database </a:t>
+            </a:r>
+            <a:endParaRPr lang="en-IN" dirty="0"/>
+          </a:p>
+        </p:txBody>
+      </p:sp>
+      <p:pic>
+        <p:nvPicPr>
+          <p:cNvPr id="5" name="Content Placeholder 4"/>
+          <p:cNvPicPr>
+            <a:picLocks noGrp="1" noChangeAspect="1"/>
+          </p:cNvPicPr>
+          <p:nvPr>
+            <p:ph sz="half" idx="2"/>
+          </p:nvPr>
+        </p:nvPicPr>
+        <p:blipFill>
+          <a:blip r:embed="rId2"/>
+          <a:stretch>
+            <a:fillRect/>
+          </a:stretch>
+        </p:blipFill>
+        <p:spPr>
+          <a:xfrm>
+            <a:off x="6019799" y="1777285"/>
+            <a:ext cx="5334000" cy="3856221"/>
+          </a:xfrm>
+          <a:prstGeom prst="rect">
+            <a:avLst/>
+          </a:prstGeom>
+        </p:spPr>
+      </p:pic>
+    </p:spTree>
+    <p:extLst>
+      <p:ext uri="{BB962C8B-B14F-4D97-AF65-F5344CB8AC3E}">
+        <p14:creationId xmlns:p14="http://schemas.microsoft.com/office/powerpoint/2010/main" val="2897650288"/>
+      </p:ext>
+    </p:extLst>
+  </p:cSld>
+  <p:clrMapOvr>
+    <a:masterClrMapping/>
+  </p:clrMapOvr>
+  <p:timing>
+    <p:tnLst>
+      <p:par>
+        <p:cTn id="1" dur="indefinite" restart="never" nodeType="tmRoot"/>
+      </p:par>
+    </p:tnLst>
+  </p:timing>
+</p:sld>
+</file>
+
+<file path=ppt/slides/slide9.xml><?xml version="1.0" encoding="utf-8"?>
+<p:sld xmlns:a="http://schemas.openxmlformats.org/drawingml/2006/main" xmlns:r="http://schemas.openxmlformats.org/officeDocument/2006/relationships" xmlns:p="http://schemas.openxmlformats.org/presentationml/2006/main">
+  <p:cSld>
+    <p:spTree>
+      <p:nvGrpSpPr>
+        <p:cNvPr id="1" name=""/>
+        <p:cNvGrpSpPr/>
+        <p:nvPr/>
+      </p:nvGrpSpPr>
+      <p:grpSpPr>
+        <a:xfrm>
+          <a:off x="0" y="0"/>
+          <a:ext cx="0" cy="0"/>
+          <a:chOff x="0" y="0"/>
+          <a:chExt cx="0" cy="0"/>
+        </a:xfrm>
+      </p:grpSpPr>
+      <p:sp>
+        <p:nvSpPr>
+          <p:cNvPr id="2" name="Title 1"/>
+          <p:cNvSpPr>
+            <a:spLocks noGrp="1"/>
+          </p:cNvSpPr>
+          <p:nvPr>
+            <p:ph type="title"/>
+          </p:nvPr>
+        </p:nvSpPr>
+        <p:spPr/>
+        <p:txBody>
+          <a:bodyPr/>
+          <a:lstStyle/>
+          <a:p>
+            <a:r>
+              <a:rPr lang="en-US" dirty="0" smtClean="0"/>
+              <a:t>RESTAURANT SERVICE</a:t>
+            </a:r>
+            <a:endParaRPr lang="en-IN" dirty="0"/>
+          </a:p>
+        </p:txBody>
+      </p:sp>
+      <p:sp>
+        <p:nvSpPr>
+          <p:cNvPr id="3" name="Content Placeholder 2"/>
+          <p:cNvSpPr>
+            <a:spLocks noGrp="1"/>
+          </p:cNvSpPr>
+          <p:nvPr>
+            <p:ph sz="half" idx="1"/>
+          </p:nvPr>
+        </p:nvSpPr>
+        <p:spPr/>
+        <p:txBody>
+          <a:bodyPr>
+            <a:normAutofit fontScale="85000" lnSpcReduction="20000"/>
+          </a:bodyPr>
+          <a:lstStyle/>
+          <a:p>
+            <a:pPr marL="0" indent="0">
+              <a:buNone/>
+            </a:pPr>
+            <a:r>
+              <a:rPr lang="en-US" dirty="0" smtClean="0"/>
+              <a:t>Purpose:</a:t>
+            </a:r>
+          </a:p>
+          <a:p>
+            <a:r>
+              <a:rPr lang="en-US" dirty="0" smtClean="0"/>
+              <a:t>Add a </a:t>
+            </a:r>
+            <a:r>
+              <a:rPr lang="en-US" dirty="0" smtClean="0"/>
+              <a:t>Restaurant and Food Item</a:t>
+            </a:r>
+            <a:endParaRPr lang="en-US" dirty="0" smtClean="0"/>
+          </a:p>
+          <a:p>
+            <a:r>
+              <a:rPr lang="en-US" dirty="0" smtClean="0"/>
+              <a:t>Get one or List of all </a:t>
+            </a:r>
+            <a:r>
+              <a:rPr lang="en-US" dirty="0" smtClean="0"/>
+              <a:t>restaurants, get ratings of restaurants</a:t>
+            </a:r>
+            <a:endParaRPr lang="en-US" dirty="0" smtClean="0"/>
+          </a:p>
+          <a:p>
+            <a:r>
+              <a:rPr lang="en-US" dirty="0" smtClean="0"/>
+              <a:t>Update or delete all </a:t>
+            </a:r>
+            <a:r>
+              <a:rPr lang="en-US" dirty="0" smtClean="0"/>
+              <a:t>restaurants and food item</a:t>
+            </a:r>
+            <a:endParaRPr lang="en-US" dirty="0" smtClean="0"/>
+          </a:p>
+          <a:p>
+            <a:pPr marL="0" indent="0">
+              <a:buNone/>
+            </a:pPr>
+            <a:endParaRPr lang="en-US" dirty="0" smtClean="0"/>
+          </a:p>
+          <a:p>
+            <a:pPr marL="0" indent="0">
+              <a:buNone/>
+            </a:pPr>
+            <a:r>
+              <a:rPr lang="en-US" dirty="0" smtClean="0"/>
+              <a:t>Restaurant details are stored in Mongo DB database</a:t>
+            </a:r>
+            <a:endParaRPr lang="en-IN" dirty="0"/>
+          </a:p>
+        </p:txBody>
+      </p:sp>
+      <p:pic>
+        <p:nvPicPr>
+          <p:cNvPr id="5" name="Content Placeholder 4"/>
+          <p:cNvPicPr>
+            <a:picLocks noGrp="1" noChangeAspect="1"/>
+          </p:cNvPicPr>
+          <p:nvPr>
+            <p:ph sz="half" idx="2"/>
+          </p:nvPr>
+        </p:nvPicPr>
+        <p:blipFill>
+          <a:blip r:embed="rId2"/>
+          <a:stretch>
+            <a:fillRect/>
+          </a:stretch>
+        </p:blipFill>
+        <p:spPr>
+          <a:xfrm>
+            <a:off x="6019799" y="2097088"/>
+            <a:ext cx="5334000" cy="3536418"/>
+          </a:xfrm>
+          <a:prstGeom prst="rect">
+            <a:avLst/>
+          </a:prstGeom>
+        </p:spPr>
+      </p:pic>
+    </p:spTree>
+    <p:extLst>
+      <p:ext uri="{BB962C8B-B14F-4D97-AF65-F5344CB8AC3E}">
+        <p14:creationId xmlns:p14="http://schemas.microsoft.com/office/powerpoint/2010/main" val="1402248809"/>
+      </p:ext>
+    </p:extLst>
+  </p:cSld>
+  <p:clrMapOvr>
+    <a:masterClrMapping/>
+  </p:clrMapOvr>
+  <p:timing>
+    <p:tnLst>
+      <p:par>
+        <p:cTn id="1" dur="indefinite" restart="never" nodeType="tmRoot"/>
+      </p:par>
+    </p:tnLst>
+  </p:timing>
 </p:sld>
 </file>
 

</xml_diff>